<commit_message>
Plots and frame from new method
</commit_message>
<xml_diff>
--- a/PPT/3D Scanner Project Progress Update (15-07-2024).pptx
+++ b/PPT/3D Scanner Project Progress Update (15-07-2024).pptx
@@ -5,7 +5,7 @@
     <p:sldMasterId id="2147483648" r:id="rId1"/>
   </p:sldMasterIdLst>
   <p:notesMasterIdLst>
-    <p:notesMasterId r:id="rId9"/>
+    <p:notesMasterId r:id="rId13"/>
   </p:notesMasterIdLst>
   <p:sldIdLst>
     <p:sldId id="256" r:id="rId2"/>
@@ -13,8 +13,12 @@
     <p:sldId id="538" r:id="rId4"/>
     <p:sldId id="543" r:id="rId5"/>
     <p:sldId id="544" r:id="rId6"/>
-    <p:sldId id="542" r:id="rId7"/>
-    <p:sldId id="273" r:id="rId8"/>
+    <p:sldId id="547" r:id="rId7"/>
+    <p:sldId id="545" r:id="rId8"/>
+    <p:sldId id="548" r:id="rId9"/>
+    <p:sldId id="546" r:id="rId10"/>
+    <p:sldId id="542" r:id="rId11"/>
+    <p:sldId id="273" r:id="rId12"/>
   </p:sldIdLst>
   <p:sldSz cx="12192000" cy="6858000"/>
   <p:notesSz cx="6858000" cy="9144000"/>
@@ -124,7 +128,7 @@
 <file path=ppt/revisionInfo.xml><?xml version="1.0" encoding="utf-8"?>
 <p1510:revInfo xmlns:a="http://schemas.openxmlformats.org/drawingml/2006/main" xmlns:r="http://schemas.openxmlformats.org/officeDocument/2006/relationships" xmlns:p1510="http://schemas.microsoft.com/office/powerpoint/2015/10/main">
   <p1510:revLst>
-    <p1510:client id="{890994B4-2AC3-4D1D-83C9-DF20D2D0DE26}" v="11" dt="2024-07-15T21:03:09.728"/>
+    <p1510:client id="{890994B4-2AC3-4D1D-83C9-DF20D2D0DE26}" v="20" dt="2024-07-16T13:23:35.787"/>
     <p1510:client id="{94293FBC-F31B-46BE-8B07-7216CDCAC933}" v="2" dt="2024-07-15T19:53:55.606"/>
   </p1510:revLst>
 </p1510:revInfo>
@@ -255,8 +259,8 @@
   </pc:docChgLst>
   <pc:docChgLst>
     <pc:chgData name="Anugrah Sebastian" userId="8686f9dd1ae651d4" providerId="LiveId" clId="{890994B4-2AC3-4D1D-83C9-DF20D2D0DE26}"/>
-    <pc:docChg chg="undo custSel addSld modSld">
-      <pc:chgData name="Anugrah Sebastian" userId="8686f9dd1ae651d4" providerId="LiveId" clId="{890994B4-2AC3-4D1D-83C9-DF20D2D0DE26}" dt="2024-07-15T21:03:09.728" v="270"/>
+    <pc:docChg chg="undo custSel addSld delSld modSld sldOrd">
+      <pc:chgData name="Anugrah Sebastian" userId="8686f9dd1ae651d4" providerId="LiveId" clId="{890994B4-2AC3-4D1D-83C9-DF20D2D0DE26}" dt="2024-07-16T13:24:54.899" v="1134" actId="20577"/>
       <pc:docMkLst>
         <pc:docMk/>
       </pc:docMkLst>
@@ -282,6 +286,161 @@
             <ac:graphicFrameMk id="3" creationId="{FB3BE865-4392-5145-3E9E-C24CE1C55DFB}"/>
           </ac:graphicFrameMkLst>
         </pc:graphicFrameChg>
+      </pc:sldChg>
+      <pc:sldChg chg="addSp delSp modSp add mod ord">
+        <pc:chgData name="Anugrah Sebastian" userId="8686f9dd1ae651d4" providerId="LiveId" clId="{890994B4-2AC3-4D1D-83C9-DF20D2D0DE26}" dt="2024-07-16T12:44:20.737" v="363" actId="1076"/>
+        <pc:sldMkLst>
+          <pc:docMk/>
+          <pc:sldMk cId="655694643" sldId="545"/>
+        </pc:sldMkLst>
+        <pc:spChg chg="del">
+          <ac:chgData name="Anugrah Sebastian" userId="8686f9dd1ae651d4" providerId="LiveId" clId="{890994B4-2AC3-4D1D-83C9-DF20D2D0DE26}" dt="2024-07-16T12:43:52.022" v="358" actId="478"/>
+          <ac:spMkLst>
+            <pc:docMk/>
+            <pc:sldMk cId="655694643" sldId="545"/>
+            <ac:spMk id="4" creationId="{00000000-0000-0000-0000-000000000000}"/>
+          </ac:spMkLst>
+        </pc:spChg>
+        <pc:spChg chg="mod">
+          <ac:chgData name="Anugrah Sebastian" userId="8686f9dd1ae651d4" providerId="LiveId" clId="{890994B4-2AC3-4D1D-83C9-DF20D2D0DE26}" dt="2024-07-16T12:43:38.321" v="354" actId="20577"/>
+          <ac:spMkLst>
+            <pc:docMk/>
+            <pc:sldMk cId="655694643" sldId="545"/>
+            <ac:spMk id="6" creationId="{00000000-0000-0000-0000-000000000000}"/>
+          </ac:spMkLst>
+        </pc:spChg>
+        <pc:picChg chg="del">
+          <ac:chgData name="Anugrah Sebastian" userId="8686f9dd1ae651d4" providerId="LiveId" clId="{890994B4-2AC3-4D1D-83C9-DF20D2D0DE26}" dt="2024-07-16T12:43:40.343" v="355" actId="478"/>
+          <ac:picMkLst>
+            <pc:docMk/>
+            <pc:sldMk cId="655694643" sldId="545"/>
+            <ac:picMk id="7" creationId="{7328E530-A53E-62FC-A320-2D0014A9D463}"/>
+          </ac:picMkLst>
+        </pc:picChg>
+        <pc:picChg chg="add mod">
+          <ac:chgData name="Anugrah Sebastian" userId="8686f9dd1ae651d4" providerId="LiveId" clId="{890994B4-2AC3-4D1D-83C9-DF20D2D0DE26}" dt="2024-07-16T12:44:20.737" v="363" actId="1076"/>
+          <ac:picMkLst>
+            <pc:docMk/>
+            <pc:sldMk cId="655694643" sldId="545"/>
+            <ac:picMk id="8" creationId="{1326D9F8-5278-3A53-20F2-EAC354A819C7}"/>
+          </ac:picMkLst>
+        </pc:picChg>
+      </pc:sldChg>
+      <pc:sldChg chg="add del">
+        <pc:chgData name="Anugrah Sebastian" userId="8686f9dd1ae651d4" providerId="LiveId" clId="{890994B4-2AC3-4D1D-83C9-DF20D2D0DE26}" dt="2024-07-16T12:43:48.174" v="357" actId="47"/>
+        <pc:sldMkLst>
+          <pc:docMk/>
+          <pc:sldMk cId="719214950" sldId="546"/>
+        </pc:sldMkLst>
+      </pc:sldChg>
+      <pc:sldChg chg="delSp modSp add mod">
+        <pc:chgData name="Anugrah Sebastian" userId="8686f9dd1ae651d4" providerId="LiveId" clId="{890994B4-2AC3-4D1D-83C9-DF20D2D0DE26}" dt="2024-07-16T13:24:54.899" v="1134" actId="20577"/>
+        <pc:sldMkLst>
+          <pc:docMk/>
+          <pc:sldMk cId="1709023871" sldId="546"/>
+        </pc:sldMkLst>
+        <pc:spChg chg="mod">
+          <ac:chgData name="Anugrah Sebastian" userId="8686f9dd1ae651d4" providerId="LiveId" clId="{890994B4-2AC3-4D1D-83C9-DF20D2D0DE26}" dt="2024-07-16T13:08:45.303" v="773" actId="5793"/>
+          <ac:spMkLst>
+            <pc:docMk/>
+            <pc:sldMk cId="1709023871" sldId="546"/>
+            <ac:spMk id="5" creationId="{00000000-0000-0000-0000-000000000000}"/>
+          </ac:spMkLst>
+        </pc:spChg>
+        <pc:spChg chg="mod">
+          <ac:chgData name="Anugrah Sebastian" userId="8686f9dd1ae651d4" providerId="LiveId" clId="{890994B4-2AC3-4D1D-83C9-DF20D2D0DE26}" dt="2024-07-16T13:24:54.899" v="1134" actId="20577"/>
+          <ac:spMkLst>
+            <pc:docMk/>
+            <pc:sldMk cId="1709023871" sldId="546"/>
+            <ac:spMk id="6" creationId="{00000000-0000-0000-0000-000000000000}"/>
+          </ac:spMkLst>
+        </pc:spChg>
+        <pc:picChg chg="del">
+          <ac:chgData name="Anugrah Sebastian" userId="8686f9dd1ae651d4" providerId="LiveId" clId="{890994B4-2AC3-4D1D-83C9-DF20D2D0DE26}" dt="2024-07-16T12:47:15.385" v="495" actId="478"/>
+          <ac:picMkLst>
+            <pc:docMk/>
+            <pc:sldMk cId="1709023871" sldId="546"/>
+            <ac:picMk id="8" creationId="{1326D9F8-5278-3A53-20F2-EAC354A819C7}"/>
+          </ac:picMkLst>
+        </pc:picChg>
+      </pc:sldChg>
+      <pc:sldChg chg="addSp delSp modSp add mod">
+        <pc:chgData name="Anugrah Sebastian" userId="8686f9dd1ae651d4" providerId="LiveId" clId="{890994B4-2AC3-4D1D-83C9-DF20D2D0DE26}" dt="2024-07-16T13:08:07.460" v="753" actId="1076"/>
+        <pc:sldMkLst>
+          <pc:docMk/>
+          <pc:sldMk cId="3836912278" sldId="547"/>
+        </pc:sldMkLst>
+        <pc:spChg chg="mod">
+          <ac:chgData name="Anugrah Sebastian" userId="8686f9dd1ae651d4" providerId="LiveId" clId="{890994B4-2AC3-4D1D-83C9-DF20D2D0DE26}" dt="2024-07-16T12:59:09.501" v="745" actId="20577"/>
+          <ac:spMkLst>
+            <pc:docMk/>
+            <pc:sldMk cId="3836912278" sldId="547"/>
+            <ac:spMk id="6" creationId="{00000000-0000-0000-0000-000000000000}"/>
+          </ac:spMkLst>
+        </pc:spChg>
+        <pc:graphicFrameChg chg="del modGraphic">
+          <ac:chgData name="Anugrah Sebastian" userId="8686f9dd1ae651d4" providerId="LiveId" clId="{890994B4-2AC3-4D1D-83C9-DF20D2D0DE26}" dt="2024-07-16T12:59:21.913" v="748" actId="478"/>
+          <ac:graphicFrameMkLst>
+            <pc:docMk/>
+            <pc:sldMk cId="3836912278" sldId="547"/>
+            <ac:graphicFrameMk id="3" creationId="{FB3BE865-4392-5145-3E9E-C24CE1C55DFB}"/>
+          </ac:graphicFrameMkLst>
+        </pc:graphicFrameChg>
+        <pc:picChg chg="add mod">
+          <ac:chgData name="Anugrah Sebastian" userId="8686f9dd1ae651d4" providerId="LiveId" clId="{890994B4-2AC3-4D1D-83C9-DF20D2D0DE26}" dt="2024-07-16T13:08:07.460" v="753" actId="1076"/>
+          <ac:picMkLst>
+            <pc:docMk/>
+            <pc:sldMk cId="3836912278" sldId="547"/>
+            <ac:picMk id="8" creationId="{63A6C38C-ED9A-967C-D271-DC3C8E514EBB}"/>
+          </ac:picMkLst>
+        </pc:picChg>
+      </pc:sldChg>
+      <pc:sldChg chg="addSp delSp modSp add mod">
+        <pc:chgData name="Anugrah Sebastian" userId="8686f9dd1ae651d4" providerId="LiveId" clId="{890994B4-2AC3-4D1D-83C9-DF20D2D0DE26}" dt="2024-07-16T13:23:53.860" v="1103" actId="1076"/>
+        <pc:sldMkLst>
+          <pc:docMk/>
+          <pc:sldMk cId="582726095" sldId="548"/>
+        </pc:sldMkLst>
+        <pc:spChg chg="mod">
+          <ac:chgData name="Anugrah Sebastian" userId="8686f9dd1ae651d4" providerId="LiveId" clId="{890994B4-2AC3-4D1D-83C9-DF20D2D0DE26}" dt="2024-07-16T13:21:02.539" v="969" actId="5793"/>
+          <ac:spMkLst>
+            <pc:docMk/>
+            <pc:sldMk cId="582726095" sldId="548"/>
+            <ac:spMk id="5" creationId="{00000000-0000-0000-0000-000000000000}"/>
+          </ac:spMkLst>
+        </pc:spChg>
+        <pc:spChg chg="mod">
+          <ac:chgData name="Anugrah Sebastian" userId="8686f9dd1ae651d4" providerId="LiveId" clId="{890994B4-2AC3-4D1D-83C9-DF20D2D0DE26}" dt="2024-07-16T13:22:38" v="1090" actId="20577"/>
+          <ac:spMkLst>
+            <pc:docMk/>
+            <pc:sldMk cId="582726095" sldId="548"/>
+            <ac:spMk id="6" creationId="{00000000-0000-0000-0000-000000000000}"/>
+          </ac:spMkLst>
+        </pc:spChg>
+        <pc:picChg chg="add mod">
+          <ac:chgData name="Anugrah Sebastian" userId="8686f9dd1ae651d4" providerId="LiveId" clId="{890994B4-2AC3-4D1D-83C9-DF20D2D0DE26}" dt="2024-07-16T13:23:52.565" v="1102" actId="1076"/>
+          <ac:picMkLst>
+            <pc:docMk/>
+            <pc:sldMk cId="582726095" sldId="548"/>
+            <ac:picMk id="4" creationId="{16134503-E226-4FC7-1D40-B144B23EBDB7}"/>
+          </ac:picMkLst>
+        </pc:picChg>
+        <pc:picChg chg="del">
+          <ac:chgData name="Anugrah Sebastian" userId="8686f9dd1ae651d4" providerId="LiveId" clId="{890994B4-2AC3-4D1D-83C9-DF20D2D0DE26}" dt="2024-07-16T13:20:26.802" v="897" actId="478"/>
+          <ac:picMkLst>
+            <pc:docMk/>
+            <pc:sldMk cId="582726095" sldId="548"/>
+            <ac:picMk id="8" creationId="{1326D9F8-5278-3A53-20F2-EAC354A819C7}"/>
+          </ac:picMkLst>
+        </pc:picChg>
+        <pc:picChg chg="add mod">
+          <ac:chgData name="Anugrah Sebastian" userId="8686f9dd1ae651d4" providerId="LiveId" clId="{890994B4-2AC3-4D1D-83C9-DF20D2D0DE26}" dt="2024-07-16T13:23:53.860" v="1103" actId="1076"/>
+          <ac:picMkLst>
+            <pc:docMk/>
+            <pc:sldMk cId="582726095" sldId="548"/>
+            <ac:picMk id="9" creationId="{D4DBB663-A1FD-3850-9068-F78E6078EBB2}"/>
+          </ac:picMkLst>
+        </pc:picChg>
       </pc:sldChg>
     </pc:docChg>
   </pc:docChgLst>
@@ -397,7 +556,7 @@
           <a:p>
             <a:fld id="{41295AE2-43AC-144B-AE88-DCB376799F11}" type="datetimeFigureOut">
               <a:rPr lang="en-US" smtClean="0"/>
-              <a:t>7/15/2024</a:t>
+              <a:t>7/16/2024</a:t>
             </a:fld>
             <a:endParaRPr lang="en-US"/>
           </a:p>
@@ -1066,7 +1225,343 @@
           <a:p>
             <a:fld id="{0F24E5BB-E6B0-B84A-ABCD-9A3E9C2D78CB}" type="slidenum">
               <a:rPr lang="en-US" smtClean="0"/>
+              <a:t>6</a:t>
+            </a:fld>
+            <a:endParaRPr lang="en-US"/>
+          </a:p>
+        </p:txBody>
+      </p:sp>
+    </p:spTree>
+    <p:extLst>
+      <p:ext uri="{BB962C8B-B14F-4D97-AF65-F5344CB8AC3E}">
+        <p14:creationId xmlns:p14="http://schemas.microsoft.com/office/powerpoint/2010/main" val="504607735"/>
+      </p:ext>
+    </p:extLst>
+  </p:cSld>
+  <p:clrMapOvr>
+    <a:masterClrMapping/>
+  </p:clrMapOvr>
+</p:notes>
+</file>
+
+<file path=ppt/notesSlides/notesSlide6.xml><?xml version="1.0" encoding="utf-8"?>
+<p:notes xmlns:a="http://schemas.openxmlformats.org/drawingml/2006/main" xmlns:r="http://schemas.openxmlformats.org/officeDocument/2006/relationships" xmlns:p="http://schemas.openxmlformats.org/presentationml/2006/main">
+  <p:cSld>
+    <p:spTree>
+      <p:nvGrpSpPr>
+        <p:cNvPr id="1" name=""/>
+        <p:cNvGrpSpPr/>
+        <p:nvPr/>
+      </p:nvGrpSpPr>
+      <p:grpSpPr>
+        <a:xfrm>
+          <a:off x="0" y="0"/>
+          <a:ext cx="0" cy="0"/>
+          <a:chOff x="0" y="0"/>
+          <a:chExt cx="0" cy="0"/>
+        </a:xfrm>
+      </p:grpSpPr>
+      <p:sp>
+        <p:nvSpPr>
+          <p:cNvPr id="2" name="Slide Image Placeholder 1"/>
+          <p:cNvSpPr>
+            <a:spLocks noGrp="1" noRot="1" noChangeAspect="1"/>
+          </p:cNvSpPr>
+          <p:nvPr>
+            <p:ph type="sldImg"/>
+          </p:nvPr>
+        </p:nvSpPr>
+        <p:spPr/>
+      </p:sp>
+      <p:sp>
+        <p:nvSpPr>
+          <p:cNvPr id="3" name="Notes Placeholder 2"/>
+          <p:cNvSpPr>
+            <a:spLocks noGrp="1"/>
+          </p:cNvSpPr>
+          <p:nvPr>
+            <p:ph type="body" idx="1"/>
+          </p:nvPr>
+        </p:nvSpPr>
+        <p:spPr/>
+        <p:txBody>
+          <a:bodyPr/>
+          <a:lstStyle/>
+          <a:p>
+            <a:endParaRPr lang="en-US"/>
+          </a:p>
+        </p:txBody>
+      </p:sp>
+      <p:sp>
+        <p:nvSpPr>
+          <p:cNvPr id="4" name="Slide Number Placeholder 3"/>
+          <p:cNvSpPr>
+            <a:spLocks noGrp="1"/>
+          </p:cNvSpPr>
+          <p:nvPr>
+            <p:ph type="sldNum" sz="quarter" idx="5"/>
+          </p:nvPr>
+        </p:nvSpPr>
+        <p:spPr/>
+        <p:txBody>
+          <a:bodyPr/>
+          <a:lstStyle/>
+          <a:p>
+            <a:fld id="{0F24E5BB-E6B0-B84A-ABCD-9A3E9C2D78CB}" type="slidenum">
+              <a:rPr lang="en-US" smtClean="0"/>
               <a:t>7</a:t>
+            </a:fld>
+            <a:endParaRPr lang="en-US"/>
+          </a:p>
+        </p:txBody>
+      </p:sp>
+    </p:spTree>
+    <p:extLst>
+      <p:ext uri="{BB962C8B-B14F-4D97-AF65-F5344CB8AC3E}">
+        <p14:creationId xmlns:p14="http://schemas.microsoft.com/office/powerpoint/2010/main" val="3920931768"/>
+      </p:ext>
+    </p:extLst>
+  </p:cSld>
+  <p:clrMapOvr>
+    <a:masterClrMapping/>
+  </p:clrMapOvr>
+</p:notes>
+</file>
+
+<file path=ppt/notesSlides/notesSlide7.xml><?xml version="1.0" encoding="utf-8"?>
+<p:notes xmlns:a="http://schemas.openxmlformats.org/drawingml/2006/main" xmlns:r="http://schemas.openxmlformats.org/officeDocument/2006/relationships" xmlns:p="http://schemas.openxmlformats.org/presentationml/2006/main">
+  <p:cSld>
+    <p:spTree>
+      <p:nvGrpSpPr>
+        <p:cNvPr id="1" name=""/>
+        <p:cNvGrpSpPr/>
+        <p:nvPr/>
+      </p:nvGrpSpPr>
+      <p:grpSpPr>
+        <a:xfrm>
+          <a:off x="0" y="0"/>
+          <a:ext cx="0" cy="0"/>
+          <a:chOff x="0" y="0"/>
+          <a:chExt cx="0" cy="0"/>
+        </a:xfrm>
+      </p:grpSpPr>
+      <p:sp>
+        <p:nvSpPr>
+          <p:cNvPr id="2" name="Slide Image Placeholder 1"/>
+          <p:cNvSpPr>
+            <a:spLocks noGrp="1" noRot="1" noChangeAspect="1"/>
+          </p:cNvSpPr>
+          <p:nvPr>
+            <p:ph type="sldImg"/>
+          </p:nvPr>
+        </p:nvSpPr>
+        <p:spPr/>
+      </p:sp>
+      <p:sp>
+        <p:nvSpPr>
+          <p:cNvPr id="3" name="Notes Placeholder 2"/>
+          <p:cNvSpPr>
+            <a:spLocks noGrp="1"/>
+          </p:cNvSpPr>
+          <p:nvPr>
+            <p:ph type="body" idx="1"/>
+          </p:nvPr>
+        </p:nvSpPr>
+        <p:spPr/>
+        <p:txBody>
+          <a:bodyPr/>
+          <a:lstStyle/>
+          <a:p>
+            <a:endParaRPr lang="en-US"/>
+          </a:p>
+        </p:txBody>
+      </p:sp>
+      <p:sp>
+        <p:nvSpPr>
+          <p:cNvPr id="4" name="Slide Number Placeholder 3"/>
+          <p:cNvSpPr>
+            <a:spLocks noGrp="1"/>
+          </p:cNvSpPr>
+          <p:nvPr>
+            <p:ph type="sldNum" sz="quarter" idx="5"/>
+          </p:nvPr>
+        </p:nvSpPr>
+        <p:spPr/>
+        <p:txBody>
+          <a:bodyPr/>
+          <a:lstStyle/>
+          <a:p>
+            <a:fld id="{0F24E5BB-E6B0-B84A-ABCD-9A3E9C2D78CB}" type="slidenum">
+              <a:rPr lang="en-US" smtClean="0"/>
+              <a:t>8</a:t>
+            </a:fld>
+            <a:endParaRPr lang="en-US"/>
+          </a:p>
+        </p:txBody>
+      </p:sp>
+    </p:spTree>
+    <p:extLst>
+      <p:ext uri="{BB962C8B-B14F-4D97-AF65-F5344CB8AC3E}">
+        <p14:creationId xmlns:p14="http://schemas.microsoft.com/office/powerpoint/2010/main" val="2874631302"/>
+      </p:ext>
+    </p:extLst>
+  </p:cSld>
+  <p:clrMapOvr>
+    <a:masterClrMapping/>
+  </p:clrMapOvr>
+</p:notes>
+</file>
+
+<file path=ppt/notesSlides/notesSlide8.xml><?xml version="1.0" encoding="utf-8"?>
+<p:notes xmlns:a="http://schemas.openxmlformats.org/drawingml/2006/main" xmlns:r="http://schemas.openxmlformats.org/officeDocument/2006/relationships" xmlns:p="http://schemas.openxmlformats.org/presentationml/2006/main">
+  <p:cSld>
+    <p:spTree>
+      <p:nvGrpSpPr>
+        <p:cNvPr id="1" name=""/>
+        <p:cNvGrpSpPr/>
+        <p:nvPr/>
+      </p:nvGrpSpPr>
+      <p:grpSpPr>
+        <a:xfrm>
+          <a:off x="0" y="0"/>
+          <a:ext cx="0" cy="0"/>
+          <a:chOff x="0" y="0"/>
+          <a:chExt cx="0" cy="0"/>
+        </a:xfrm>
+      </p:grpSpPr>
+      <p:sp>
+        <p:nvSpPr>
+          <p:cNvPr id="2" name="Slide Image Placeholder 1"/>
+          <p:cNvSpPr>
+            <a:spLocks noGrp="1" noRot="1" noChangeAspect="1"/>
+          </p:cNvSpPr>
+          <p:nvPr>
+            <p:ph type="sldImg"/>
+          </p:nvPr>
+        </p:nvSpPr>
+        <p:spPr/>
+      </p:sp>
+      <p:sp>
+        <p:nvSpPr>
+          <p:cNvPr id="3" name="Notes Placeholder 2"/>
+          <p:cNvSpPr>
+            <a:spLocks noGrp="1"/>
+          </p:cNvSpPr>
+          <p:nvPr>
+            <p:ph type="body" idx="1"/>
+          </p:nvPr>
+        </p:nvSpPr>
+        <p:spPr/>
+        <p:txBody>
+          <a:bodyPr/>
+          <a:lstStyle/>
+          <a:p>
+            <a:endParaRPr lang="en-US"/>
+          </a:p>
+        </p:txBody>
+      </p:sp>
+      <p:sp>
+        <p:nvSpPr>
+          <p:cNvPr id="4" name="Slide Number Placeholder 3"/>
+          <p:cNvSpPr>
+            <a:spLocks noGrp="1"/>
+          </p:cNvSpPr>
+          <p:nvPr>
+            <p:ph type="sldNum" sz="quarter" idx="5"/>
+          </p:nvPr>
+        </p:nvSpPr>
+        <p:spPr/>
+        <p:txBody>
+          <a:bodyPr/>
+          <a:lstStyle/>
+          <a:p>
+            <a:fld id="{0F24E5BB-E6B0-B84A-ABCD-9A3E9C2D78CB}" type="slidenum">
+              <a:rPr lang="en-US" smtClean="0"/>
+              <a:t>9</a:t>
+            </a:fld>
+            <a:endParaRPr lang="en-US"/>
+          </a:p>
+        </p:txBody>
+      </p:sp>
+    </p:spTree>
+    <p:extLst>
+      <p:ext uri="{BB962C8B-B14F-4D97-AF65-F5344CB8AC3E}">
+        <p14:creationId xmlns:p14="http://schemas.microsoft.com/office/powerpoint/2010/main" val="3440131702"/>
+      </p:ext>
+    </p:extLst>
+  </p:cSld>
+  <p:clrMapOvr>
+    <a:masterClrMapping/>
+  </p:clrMapOvr>
+</p:notes>
+</file>
+
+<file path=ppt/notesSlides/notesSlide9.xml><?xml version="1.0" encoding="utf-8"?>
+<p:notes xmlns:a="http://schemas.openxmlformats.org/drawingml/2006/main" xmlns:r="http://schemas.openxmlformats.org/officeDocument/2006/relationships" xmlns:p="http://schemas.openxmlformats.org/presentationml/2006/main">
+  <p:cSld>
+    <p:spTree>
+      <p:nvGrpSpPr>
+        <p:cNvPr id="1" name=""/>
+        <p:cNvGrpSpPr/>
+        <p:nvPr/>
+      </p:nvGrpSpPr>
+      <p:grpSpPr>
+        <a:xfrm>
+          <a:off x="0" y="0"/>
+          <a:ext cx="0" cy="0"/>
+          <a:chOff x="0" y="0"/>
+          <a:chExt cx="0" cy="0"/>
+        </a:xfrm>
+      </p:grpSpPr>
+      <p:sp>
+        <p:nvSpPr>
+          <p:cNvPr id="2" name="Slide Image Placeholder 1"/>
+          <p:cNvSpPr>
+            <a:spLocks noGrp="1" noRot="1" noChangeAspect="1"/>
+          </p:cNvSpPr>
+          <p:nvPr>
+            <p:ph type="sldImg"/>
+          </p:nvPr>
+        </p:nvSpPr>
+        <p:spPr/>
+      </p:sp>
+      <p:sp>
+        <p:nvSpPr>
+          <p:cNvPr id="3" name="Notes Placeholder 2"/>
+          <p:cNvSpPr>
+            <a:spLocks noGrp="1"/>
+          </p:cNvSpPr>
+          <p:nvPr>
+            <p:ph type="body" idx="1"/>
+          </p:nvPr>
+        </p:nvSpPr>
+        <p:spPr/>
+        <p:txBody>
+          <a:bodyPr/>
+          <a:lstStyle/>
+          <a:p>
+            <a:endParaRPr lang="en-US"/>
+          </a:p>
+        </p:txBody>
+      </p:sp>
+      <p:sp>
+        <p:nvSpPr>
+          <p:cNvPr id="4" name="Slide Number Placeholder 3"/>
+          <p:cNvSpPr>
+            <a:spLocks noGrp="1"/>
+          </p:cNvSpPr>
+          <p:nvPr>
+            <p:ph type="sldNum" sz="quarter" idx="5"/>
+          </p:nvPr>
+        </p:nvSpPr>
+        <p:spPr/>
+        <p:txBody>
+          <a:bodyPr/>
+          <a:lstStyle/>
+          <a:p>
+            <a:fld id="{0F24E5BB-E6B0-B84A-ABCD-9A3E9C2D78CB}" type="slidenum">
+              <a:rPr lang="en-US" smtClean="0"/>
+              <a:t>11</a:t>
             </a:fld>
             <a:endParaRPr lang="en-US"/>
           </a:p>
@@ -3456,6 +3951,687 @@
     <p:extLst>
       <p:ext uri="{BB962C8B-B14F-4D97-AF65-F5344CB8AC3E}">
         <p14:creationId xmlns:p14="http://schemas.microsoft.com/office/powerpoint/2010/main" val="4244171547"/>
+      </p:ext>
+    </p:extLst>
+  </p:cSld>
+  <p:clrMapOvr>
+    <a:masterClrMapping/>
+  </p:clrMapOvr>
+</p:sld>
+</file>
+
+<file path=ppt/slides/slide10.xml><?xml version="1.0" encoding="utf-8"?>
+<p:sld xmlns:a="http://schemas.openxmlformats.org/drawingml/2006/main" xmlns:r="http://schemas.openxmlformats.org/officeDocument/2006/relationships" xmlns:p="http://schemas.openxmlformats.org/presentationml/2006/main">
+  <p:cSld>
+    <p:spTree>
+      <p:nvGrpSpPr>
+        <p:cNvPr id="1" name=""/>
+        <p:cNvGrpSpPr/>
+        <p:nvPr/>
+      </p:nvGrpSpPr>
+      <p:grpSpPr>
+        <a:xfrm>
+          <a:off x="0" y="0"/>
+          <a:ext cx="0" cy="0"/>
+          <a:chOff x="0" y="0"/>
+          <a:chExt cx="0" cy="0"/>
+        </a:xfrm>
+      </p:grpSpPr>
+      <p:sp>
+        <p:nvSpPr>
+          <p:cNvPr id="3" name="Content Placeholder 2">
+            <a:extLst>
+              <a:ext uri="{FF2B5EF4-FFF2-40B4-BE49-F238E27FC236}">
+                <a16:creationId xmlns:a16="http://schemas.microsoft.com/office/drawing/2014/main" id="{0F349726-1B51-D7EB-DB1F-E4C8AC0ADCFA}"/>
+              </a:ext>
+            </a:extLst>
+          </p:cNvPr>
+          <p:cNvSpPr>
+            <a:spLocks noGrp="1"/>
+          </p:cNvSpPr>
+          <p:nvPr>
+            <p:ph sz="quarter" idx="13"/>
+          </p:nvPr>
+        </p:nvSpPr>
+        <p:spPr>
+          <a:xfrm>
+            <a:off x="285750" y="1396538"/>
+            <a:ext cx="11474450" cy="5461462"/>
+          </a:xfrm>
+        </p:spPr>
+        <p:txBody>
+          <a:bodyPr>
+            <a:normAutofit/>
+          </a:bodyPr>
+          <a:lstStyle/>
+          <a:p>
+            <a:pPr marL="0" indent="0">
+              <a:buNone/>
+            </a:pPr>
+            <a:endParaRPr lang="en-GB" sz="2400" b="1" dirty="0"/>
+          </a:p>
+          <a:p>
+            <a:pPr>
+              <a:spcAft>
+                <a:spcPts val="667"/>
+              </a:spcAft>
+            </a:pPr>
+            <a:r>
+              <a:rPr lang="en-US" b="0" i="0" dirty="0">
+                <a:solidFill>
+                  <a:srgbClr val="222222"/>
+                </a:solidFill>
+                <a:effectLst/>
+                <a:highlight>
+                  <a:srgbClr val="FFFFFF"/>
+                </a:highlight>
+                <a:latin typeface="Arial" panose="020B0604020202020204" pitchFamily="34" charset="0"/>
+              </a:rPr>
+              <a:t>Muñoz-Rodríguez, J. A., &amp; Rodríguez-Vera, R. (2003). Evaluation of the light line displacement location for object shape detection. </a:t>
+            </a:r>
+            <a:r>
+              <a:rPr lang="en-US" b="0" i="1" dirty="0">
+                <a:solidFill>
+                  <a:srgbClr val="222222"/>
+                </a:solidFill>
+                <a:effectLst/>
+                <a:highlight>
+                  <a:srgbClr val="FFFFFF"/>
+                </a:highlight>
+                <a:latin typeface="Arial" panose="020B0604020202020204" pitchFamily="34" charset="0"/>
+              </a:rPr>
+              <a:t>Journal of Modern Optics</a:t>
+            </a:r>
+            <a:r>
+              <a:rPr lang="en-US" b="0" i="0" dirty="0">
+                <a:solidFill>
+                  <a:srgbClr val="222222"/>
+                </a:solidFill>
+                <a:effectLst/>
+                <a:highlight>
+                  <a:srgbClr val="FFFFFF"/>
+                </a:highlight>
+                <a:latin typeface="Arial" panose="020B0604020202020204" pitchFamily="34" charset="0"/>
+              </a:rPr>
+              <a:t>, </a:t>
+            </a:r>
+            <a:r>
+              <a:rPr lang="en-US" b="0" i="1" dirty="0">
+                <a:solidFill>
+                  <a:srgbClr val="222222"/>
+                </a:solidFill>
+                <a:effectLst/>
+                <a:highlight>
+                  <a:srgbClr val="FFFFFF"/>
+                </a:highlight>
+                <a:latin typeface="Arial" panose="020B0604020202020204" pitchFamily="34" charset="0"/>
+              </a:rPr>
+              <a:t>50</a:t>
+            </a:r>
+            <a:r>
+              <a:rPr lang="en-US" b="0" i="0" dirty="0">
+                <a:solidFill>
+                  <a:srgbClr val="222222"/>
+                </a:solidFill>
+                <a:effectLst/>
+                <a:highlight>
+                  <a:srgbClr val="FFFFFF"/>
+                </a:highlight>
+                <a:latin typeface="Arial" panose="020B0604020202020204" pitchFamily="34" charset="0"/>
+              </a:rPr>
+              <a:t>(1), 137-154.</a:t>
+            </a:r>
+            <a:endParaRPr lang="en-US" dirty="0"/>
+          </a:p>
+        </p:txBody>
+      </p:sp>
+      <p:sp>
+        <p:nvSpPr>
+          <p:cNvPr id="6" name="Title 1">
+            <a:extLst>
+              <a:ext uri="{FF2B5EF4-FFF2-40B4-BE49-F238E27FC236}">
+                <a16:creationId xmlns:a16="http://schemas.microsoft.com/office/drawing/2014/main" id="{95C129E1-1239-6722-6D85-75E66B0DF631}"/>
+              </a:ext>
+            </a:extLst>
+          </p:cNvPr>
+          <p:cNvSpPr>
+            <a:spLocks noGrp="1"/>
+          </p:cNvSpPr>
+          <p:nvPr>
+            <p:ph type="title"/>
+          </p:nvPr>
+        </p:nvSpPr>
+        <p:spPr>
+          <a:xfrm>
+            <a:off x="2752437" y="706583"/>
+            <a:ext cx="9210963" cy="888786"/>
+          </a:xfrm>
+          <a:prstGeom prst="rect">
+            <a:avLst/>
+          </a:prstGeom>
+        </p:spPr>
+        <p:txBody>
+          <a:bodyPr>
+            <a:normAutofit/>
+          </a:bodyPr>
+          <a:lstStyle/>
+          <a:p>
+            <a:pPr algn="l"/>
+            <a:r>
+              <a:rPr lang="en-US" sz="3200" dirty="0"/>
+              <a:t>References</a:t>
+            </a:r>
+            <a:endParaRPr lang="en-US" dirty="0"/>
+          </a:p>
+        </p:txBody>
+      </p:sp>
+      <p:sp>
+        <p:nvSpPr>
+          <p:cNvPr id="2" name="Slide Number Placeholder 1">
+            <a:extLst>
+              <a:ext uri="{FF2B5EF4-FFF2-40B4-BE49-F238E27FC236}">
+                <a16:creationId xmlns:a16="http://schemas.microsoft.com/office/drawing/2014/main" id="{EE133BF1-8CE4-50C7-E9E4-3D466980A344}"/>
+              </a:ext>
+            </a:extLst>
+          </p:cNvPr>
+          <p:cNvSpPr>
+            <a:spLocks noGrp="1"/>
+          </p:cNvSpPr>
+          <p:nvPr>
+            <p:ph type="sldNum" sz="quarter" idx="15"/>
+          </p:nvPr>
+        </p:nvSpPr>
+        <p:spPr/>
+        <p:txBody>
+          <a:bodyPr/>
+          <a:lstStyle/>
+          <a:p>
+            <a:fld id="{0A19F3F6-C255-4AC5-91C2-3F61B6509B36}" type="slidenum">
+              <a:rPr lang="en-GB" smtClean="0"/>
+              <a:t>10</a:t>
+            </a:fld>
+            <a:endParaRPr lang="en-GB"/>
+          </a:p>
+        </p:txBody>
+      </p:sp>
+    </p:spTree>
+    <p:extLst>
+      <p:ext uri="{BB962C8B-B14F-4D97-AF65-F5344CB8AC3E}">
+        <p14:creationId xmlns:p14="http://schemas.microsoft.com/office/powerpoint/2010/main" val="3458222353"/>
+      </p:ext>
+    </p:extLst>
+  </p:cSld>
+  <p:clrMapOvr>
+    <a:masterClrMapping/>
+  </p:clrMapOvr>
+</p:sld>
+</file>
+
+<file path=ppt/slides/slide11.xml><?xml version="1.0" encoding="utf-8"?>
+<p:sld xmlns:a="http://schemas.openxmlformats.org/drawingml/2006/main" xmlns:r="http://schemas.openxmlformats.org/officeDocument/2006/relationships" xmlns:p="http://schemas.openxmlformats.org/presentationml/2006/main">
+  <p:cSld>
+    <p:spTree>
+      <p:nvGrpSpPr>
+        <p:cNvPr id="1" name=""/>
+        <p:cNvGrpSpPr/>
+        <p:nvPr/>
+      </p:nvGrpSpPr>
+      <p:grpSpPr>
+        <a:xfrm>
+          <a:off x="0" y="0"/>
+          <a:ext cx="0" cy="0"/>
+          <a:chOff x="0" y="0"/>
+          <a:chExt cx="0" cy="0"/>
+        </a:xfrm>
+      </p:grpSpPr>
+      <p:pic>
+        <p:nvPicPr>
+          <p:cNvPr id="11" name="Picture 10" descr="The University at sunset">
+            <a:extLst>
+              <a:ext uri="{FF2B5EF4-FFF2-40B4-BE49-F238E27FC236}">
+                <a16:creationId xmlns:a16="http://schemas.microsoft.com/office/drawing/2014/main" id="{778F38A2-01CF-7145-BA22-B7FAA65198FD}"/>
+              </a:ext>
+            </a:extLst>
+          </p:cNvPr>
+          <p:cNvPicPr>
+            <a:picLocks noChangeAspect="1"/>
+          </p:cNvPicPr>
+          <p:nvPr/>
+        </p:nvPicPr>
+        <p:blipFill>
+          <a:blip r:embed="rId3">
+            <a:extLst>
+              <a:ext uri="{28A0092B-C50C-407E-A947-70E740481C1C}">
+                <a14:useLocalDpi xmlns:a14="http://schemas.microsoft.com/office/drawing/2010/main"/>
+              </a:ext>
+            </a:extLst>
+          </a:blip>
+          <a:stretch>
+            <a:fillRect/>
+          </a:stretch>
+        </p:blipFill>
+        <p:spPr>
+          <a:xfrm>
+            <a:off x="0" y="0"/>
+            <a:ext cx="12192000" cy="6858000"/>
+          </a:xfrm>
+          <a:prstGeom prst="rect">
+            <a:avLst/>
+          </a:prstGeom>
+        </p:spPr>
+      </p:pic>
+      <p:sp>
+        <p:nvSpPr>
+          <p:cNvPr id="2" name="Title 1">
+            <a:extLst>
+              <a:ext uri="{FF2B5EF4-FFF2-40B4-BE49-F238E27FC236}">
+                <a16:creationId xmlns:a16="http://schemas.microsoft.com/office/drawing/2014/main" id="{72C03AA1-5E47-2841-A2C0-74489FA31DDB}"/>
+              </a:ext>
+            </a:extLst>
+          </p:cNvPr>
+          <p:cNvSpPr>
+            <a:spLocks noGrp="1"/>
+          </p:cNvSpPr>
+          <p:nvPr>
+            <p:ph type="title" idx="4294967295"/>
+          </p:nvPr>
+        </p:nvSpPr>
+        <p:spPr>
+          <a:xfrm>
+            <a:off x="647700" y="1798637"/>
+            <a:ext cx="7737528" cy="2100263"/>
+          </a:xfrm>
+        </p:spPr>
+        <p:txBody>
+          <a:bodyPr>
+            <a:noAutofit/>
+          </a:bodyPr>
+          <a:lstStyle/>
+          <a:p>
+            <a:pPr algn="l"/>
+            <a:r>
+              <a:rPr lang="en-GB" dirty="0">
+                <a:solidFill>
+                  <a:schemeClr val="bg1"/>
+                </a:solidFill>
+              </a:rPr>
+              <a:t>Thanks!</a:t>
+            </a:r>
+          </a:p>
+        </p:txBody>
+      </p:sp>
+      <p:grpSp>
+        <p:nvGrpSpPr>
+          <p:cNvPr id="20" name="Group 19">
+            <a:extLst>
+              <a:ext uri="{FF2B5EF4-FFF2-40B4-BE49-F238E27FC236}">
+                <a16:creationId xmlns:a16="http://schemas.microsoft.com/office/drawing/2014/main" id="{5E3432E9-D115-206D-6431-B4CF6626BE5C}"/>
+              </a:ext>
+              <a:ext uri="{C183D7F6-B498-43B3-948B-1728B52AA6E4}">
+                <adec:decorative xmlns:adec="http://schemas.microsoft.com/office/drawing/2017/decorative" val="1"/>
+              </a:ext>
+            </a:extLst>
+          </p:cNvPr>
+          <p:cNvGrpSpPr/>
+          <p:nvPr/>
+        </p:nvGrpSpPr>
+        <p:grpSpPr>
+          <a:xfrm>
+            <a:off x="8385228" y="5699322"/>
+            <a:ext cx="3413095" cy="854153"/>
+            <a:chOff x="8385228" y="5699322"/>
+            <a:chExt cx="3413095" cy="854153"/>
+          </a:xfrm>
+        </p:grpSpPr>
+        <p:sp>
+          <p:nvSpPr>
+            <p:cNvPr id="21" name="TextBox 20">
+              <a:extLst>
+                <a:ext uri="{FF2B5EF4-FFF2-40B4-BE49-F238E27FC236}">
+                  <a16:creationId xmlns:a16="http://schemas.microsoft.com/office/drawing/2014/main" id="{1040EF60-50F4-EBB4-F749-2CF288220BA6}"/>
+                </a:ext>
+              </a:extLst>
+            </p:cNvPr>
+            <p:cNvSpPr txBox="1"/>
+            <p:nvPr/>
+          </p:nvSpPr>
+          <p:spPr>
+            <a:xfrm>
+              <a:off x="8385228" y="5699322"/>
+              <a:ext cx="3413095" cy="461665"/>
+            </a:xfrm>
+            <a:prstGeom prst="rect">
+              <a:avLst/>
+            </a:prstGeom>
+            <a:noFill/>
+            <a:effectLst>
+              <a:outerShdw blurRad="1270000" dist="50800" dir="5400000" sx="200000" sy="200000" algn="ctr" rotWithShape="0">
+                <a:schemeClr val="tx1"/>
+              </a:outerShdw>
+            </a:effectLst>
+          </p:spPr>
+          <p:txBody>
+            <a:bodyPr wrap="square" rtlCol="0">
+              <a:spAutoFit/>
+            </a:bodyPr>
+            <a:lstStyle/>
+            <a:p>
+              <a:pPr algn="r"/>
+              <a:r>
+                <a:rPr lang="en-US" sz="2400" b="1" dirty="0">
+                  <a:solidFill>
+                    <a:schemeClr val="bg1"/>
+                  </a:solidFill>
+                  <a:latin typeface="Arial" panose="020B0604020202020204" pitchFamily="34" charset="0"/>
+                  <a:cs typeface="Arial" panose="020B0604020202020204" pitchFamily="34" charset="0"/>
+                </a:rPr>
+                <a:t>#</a:t>
+              </a:r>
+              <a:r>
+                <a:rPr lang="en-US" sz="2400" b="1" dirty="0" err="1">
+                  <a:solidFill>
+                    <a:schemeClr val="bg1"/>
+                  </a:solidFill>
+                  <a:latin typeface="Arial" panose="020B0604020202020204" pitchFamily="34" charset="0"/>
+                  <a:cs typeface="Arial" panose="020B0604020202020204" pitchFamily="34" charset="0"/>
+                </a:rPr>
+                <a:t>UofGWorldChangers</a:t>
+              </a:r>
+              <a:endParaRPr lang="en-US" sz="2400" b="1" dirty="0">
+                <a:solidFill>
+                  <a:schemeClr val="bg1"/>
+                </a:solidFill>
+                <a:latin typeface="Arial" panose="020B0604020202020204" pitchFamily="34" charset="0"/>
+                <a:cs typeface="Arial" panose="020B0604020202020204" pitchFamily="34" charset="0"/>
+              </a:endParaRPr>
+            </a:p>
+          </p:txBody>
+        </p:sp>
+        <p:sp>
+          <p:nvSpPr>
+            <p:cNvPr id="22" name="TextBox 21">
+              <a:extLst>
+                <a:ext uri="{FF2B5EF4-FFF2-40B4-BE49-F238E27FC236}">
+                  <a16:creationId xmlns:a16="http://schemas.microsoft.com/office/drawing/2014/main" id="{C10F721E-3F58-C3D6-3764-8B8557371C56}"/>
+                </a:ext>
+              </a:extLst>
+            </p:cNvPr>
+            <p:cNvSpPr txBox="1"/>
+            <p:nvPr/>
+          </p:nvSpPr>
+          <p:spPr>
+            <a:xfrm>
+              <a:off x="9098531" y="6091810"/>
+              <a:ext cx="2699792" cy="461665"/>
+            </a:xfrm>
+            <a:prstGeom prst="rect">
+              <a:avLst/>
+            </a:prstGeom>
+            <a:noFill/>
+          </p:spPr>
+          <p:txBody>
+            <a:bodyPr wrap="square" rtlCol="0">
+              <a:spAutoFit/>
+            </a:bodyPr>
+            <a:lstStyle/>
+            <a:p>
+              <a:pPr algn="r"/>
+              <a:r>
+                <a:rPr lang="en-US" sz="2400" b="1" dirty="0">
+                  <a:solidFill>
+                    <a:schemeClr val="bg1"/>
+                  </a:solidFill>
+                  <a:latin typeface="Arial" panose="020B0604020202020204" pitchFamily="34" charset="0"/>
+                  <a:ea typeface="Arial" charset="0"/>
+                  <a:cs typeface="Arial" panose="020B0604020202020204" pitchFamily="34" charset="0"/>
+                </a:rPr>
+                <a:t>@</a:t>
+              </a:r>
+              <a:r>
+                <a:rPr lang="en-US" sz="2400" b="1" dirty="0" err="1">
+                  <a:solidFill>
+                    <a:schemeClr val="bg1"/>
+                  </a:solidFill>
+                  <a:latin typeface="Arial" panose="020B0604020202020204" pitchFamily="34" charset="0"/>
+                  <a:ea typeface="Arial" charset="0"/>
+                  <a:cs typeface="Arial" panose="020B0604020202020204" pitchFamily="34" charset="0"/>
+                </a:rPr>
+                <a:t>UofGlasgow</a:t>
+              </a:r>
+              <a:endParaRPr lang="en-US" sz="2400" b="1" dirty="0">
+                <a:solidFill>
+                  <a:schemeClr val="bg1"/>
+                </a:solidFill>
+                <a:latin typeface="Arial" panose="020B0604020202020204" pitchFamily="34" charset="0"/>
+                <a:ea typeface="Arial" charset="0"/>
+                <a:cs typeface="Arial" panose="020B0604020202020204" pitchFamily="34" charset="0"/>
+              </a:endParaRPr>
+            </a:p>
+          </p:txBody>
+        </p:sp>
+        <p:grpSp>
+          <p:nvGrpSpPr>
+            <p:cNvPr id="23" name="Group 22">
+              <a:extLst>
+                <a:ext uri="{FF2B5EF4-FFF2-40B4-BE49-F238E27FC236}">
+                  <a16:creationId xmlns:a16="http://schemas.microsoft.com/office/drawing/2014/main" id="{71243618-BCA5-59B7-3F2F-003585B767A8}"/>
+                </a:ext>
+              </a:extLst>
+            </p:cNvPr>
+            <p:cNvGrpSpPr/>
+            <p:nvPr/>
+          </p:nvGrpSpPr>
+          <p:grpSpPr>
+            <a:xfrm>
+              <a:off x="8516481" y="6162367"/>
+              <a:ext cx="841333" cy="347112"/>
+              <a:chOff x="8601252" y="6162367"/>
+              <a:chExt cx="841333" cy="347112"/>
+            </a:xfrm>
+          </p:grpSpPr>
+          <p:pic>
+            <p:nvPicPr>
+              <p:cNvPr id="24" name="Picture 23">
+                <a:extLst>
+                  <a:ext uri="{FF2B5EF4-FFF2-40B4-BE49-F238E27FC236}">
+                    <a16:creationId xmlns:a16="http://schemas.microsoft.com/office/drawing/2014/main" id="{CEF1E1D0-4776-66CA-6593-212D8816FACD}"/>
+                  </a:ext>
+                  <a:ext uri="{C183D7F6-B498-43B3-948B-1728B52AA6E4}">
+                    <adec:decorative xmlns:adec="http://schemas.microsoft.com/office/drawing/2017/decorative" val="1"/>
+                  </a:ext>
+                </a:extLst>
+              </p:cNvPr>
+              <p:cNvPicPr>
+                <a:picLocks noChangeAspect="1"/>
+              </p:cNvPicPr>
+              <p:nvPr/>
+            </p:nvPicPr>
+            <p:blipFill>
+              <a:blip r:embed="rId4" cstate="print">
+                <a:extLst>
+                  <a:ext uri="{28A0092B-C50C-407E-A947-70E740481C1C}">
+                    <a14:useLocalDpi xmlns:a14="http://schemas.microsoft.com/office/drawing/2010/main" val="0"/>
+                  </a:ext>
+                </a:extLst>
+              </a:blip>
+              <a:stretch>
+                <a:fillRect/>
+              </a:stretch>
+            </p:blipFill>
+            <p:spPr>
+              <a:xfrm>
+                <a:off x="8778761" y="6162367"/>
+                <a:ext cx="475023" cy="347112"/>
+              </a:xfrm>
+              <a:prstGeom prst="rect">
+                <a:avLst/>
+              </a:prstGeom>
+            </p:spPr>
+          </p:pic>
+          <p:pic>
+            <p:nvPicPr>
+              <p:cNvPr id="25" name="Picture 24">
+                <a:extLst>
+                  <a:ext uri="{FF2B5EF4-FFF2-40B4-BE49-F238E27FC236}">
+                    <a16:creationId xmlns:a16="http://schemas.microsoft.com/office/drawing/2014/main" id="{DA87A7A4-A77D-8F28-1744-96EEB60F0D7C}"/>
+                  </a:ext>
+                  <a:ext uri="{C183D7F6-B498-43B3-948B-1728B52AA6E4}">
+                    <adec:decorative xmlns:adec="http://schemas.microsoft.com/office/drawing/2017/decorative" val="1"/>
+                  </a:ext>
+                </a:extLst>
+              </p:cNvPr>
+              <p:cNvPicPr>
+                <a:picLocks noChangeAspect="1"/>
+              </p:cNvPicPr>
+              <p:nvPr/>
+            </p:nvPicPr>
+            <p:blipFill>
+              <a:blip r:embed="rId5" cstate="screen">
+                <a:extLst>
+                  <a:ext uri="{28A0092B-C50C-407E-A947-70E740481C1C}">
+                    <a14:useLocalDpi xmlns:a14="http://schemas.microsoft.com/office/drawing/2010/main"/>
+                  </a:ext>
+                </a:extLst>
+              </a:blip>
+              <a:stretch>
+                <a:fillRect/>
+              </a:stretch>
+            </p:blipFill>
+            <p:spPr>
+              <a:xfrm>
+                <a:off x="9194185" y="6223334"/>
+                <a:ext cx="248400" cy="248399"/>
+              </a:xfrm>
+              <a:prstGeom prst="rect">
+                <a:avLst/>
+              </a:prstGeom>
+            </p:spPr>
+          </p:pic>
+          <p:pic>
+            <p:nvPicPr>
+              <p:cNvPr id="26" name="Picture 25">
+                <a:extLst>
+                  <a:ext uri="{FF2B5EF4-FFF2-40B4-BE49-F238E27FC236}">
+                    <a16:creationId xmlns:a16="http://schemas.microsoft.com/office/drawing/2014/main" id="{0414EE59-FA10-EF9D-539B-501F9400A104}"/>
+                  </a:ext>
+                  <a:ext uri="{C183D7F6-B498-43B3-948B-1728B52AA6E4}">
+                    <adec:decorative xmlns:adec="http://schemas.microsoft.com/office/drawing/2017/decorative" val="1"/>
+                  </a:ext>
+                </a:extLst>
+              </p:cNvPr>
+              <p:cNvPicPr>
+                <a:picLocks noChangeAspect="1"/>
+              </p:cNvPicPr>
+              <p:nvPr/>
+            </p:nvPicPr>
+            <p:blipFill>
+              <a:blip r:embed="rId6" cstate="screen">
+                <a:extLst>
+                  <a:ext uri="{28A0092B-C50C-407E-A947-70E740481C1C}">
+                    <a14:useLocalDpi xmlns:a14="http://schemas.microsoft.com/office/drawing/2010/main"/>
+                  </a:ext>
+                </a:extLst>
+              </a:blip>
+              <a:stretch>
+                <a:fillRect/>
+              </a:stretch>
+            </p:blipFill>
+            <p:spPr>
+              <a:xfrm>
+                <a:off x="8601252" y="6221141"/>
+                <a:ext cx="239105" cy="239106"/>
+              </a:xfrm>
+              <a:prstGeom prst="rect">
+                <a:avLst/>
+              </a:prstGeom>
+            </p:spPr>
+          </p:pic>
+        </p:grpSp>
+      </p:grpSp>
+      <mc:AlternateContent xmlns:mc="http://schemas.openxmlformats.org/markup-compatibility/2006" xmlns:p14="http://schemas.microsoft.com/office/powerpoint/2010/main">
+        <mc:Choice Requires="p14">
+          <p:contentPart p14:bwMode="auto" r:id="rId7">
+            <p14:nvContentPartPr>
+              <p14:cNvPr id="3" name="Ink 2">
+                <a:extLst>
+                  <a:ext uri="{FF2B5EF4-FFF2-40B4-BE49-F238E27FC236}">
+                    <a16:creationId xmlns:a16="http://schemas.microsoft.com/office/drawing/2014/main" id="{8B74F3EA-53B4-1C23-219F-09709BEB3511}"/>
+                  </a:ext>
+                </a:extLst>
+              </p14:cNvPr>
+              <p14:cNvContentPartPr/>
+              <p14:nvPr/>
+            </p14:nvContentPartPr>
+            <p14:xfrm>
+              <a:off x="2875547" y="1696187"/>
+              <a:ext cx="360" cy="360"/>
+            </p14:xfrm>
+          </p:contentPart>
+        </mc:Choice>
+        <mc:Fallback xmlns="">
+          <p:pic>
+            <p:nvPicPr>
+              <p:cNvPr id="3" name="Ink 2">
+                <a:extLst>
+                  <a:ext uri="{FF2B5EF4-FFF2-40B4-BE49-F238E27FC236}">
+                    <a16:creationId xmlns:a16="http://schemas.microsoft.com/office/drawing/2014/main" id="{8B74F3EA-53B4-1C23-219F-09709BEB3511}"/>
+                  </a:ext>
+                </a:extLst>
+              </p:cNvPr>
+              <p:cNvPicPr/>
+              <p:nvPr/>
+            </p:nvPicPr>
+            <p:blipFill>
+              <a:blip r:embed="rId8"/>
+              <a:stretch>
+                <a:fillRect/>
+              </a:stretch>
+            </p:blipFill>
+            <p:spPr>
+              <a:xfrm>
+                <a:off x="2869427" y="1690067"/>
+                <a:ext cx="12600" cy="12600"/>
+              </a:xfrm>
+              <a:prstGeom prst="rect">
+                <a:avLst/>
+              </a:prstGeom>
+            </p:spPr>
+          </p:pic>
+        </mc:Fallback>
+      </mc:AlternateContent>
+      <p:sp>
+        <p:nvSpPr>
+          <p:cNvPr id="5" name="Slide Number Placeholder 4">
+            <a:extLst>
+              <a:ext uri="{FF2B5EF4-FFF2-40B4-BE49-F238E27FC236}">
+                <a16:creationId xmlns:a16="http://schemas.microsoft.com/office/drawing/2014/main" id="{C15617A7-40BC-533A-C704-817C6437FA9D}"/>
+              </a:ext>
+            </a:extLst>
+          </p:cNvPr>
+          <p:cNvSpPr>
+            <a:spLocks noGrp="1"/>
+          </p:cNvSpPr>
+          <p:nvPr>
+            <p:ph type="sldNum" sz="quarter" idx="16"/>
+          </p:nvPr>
+        </p:nvSpPr>
+        <p:spPr/>
+        <p:txBody>
+          <a:bodyPr/>
+          <a:lstStyle/>
+          <a:p>
+            <a:fld id="{0A19F3F6-C255-4AC5-91C2-3F61B6509B36}" type="slidenum">
+              <a:rPr lang="en-GB" smtClean="0"/>
+              <a:t>11</a:t>
+            </a:fld>
+            <a:endParaRPr lang="en-GB"/>
+          </a:p>
+        </p:txBody>
+      </p:sp>
+    </p:spTree>
+    <p:extLst>
+      <p:ext uri="{BB962C8B-B14F-4D97-AF65-F5344CB8AC3E}">
+        <p14:creationId xmlns:p14="http://schemas.microsoft.com/office/powerpoint/2010/main" val="3006378702"/>
       </p:ext>
     </p:extLst>
   </p:cSld>
@@ -4859,121 +6035,65 @@
       </p:grpSpPr>
       <p:sp>
         <p:nvSpPr>
-          <p:cNvPr id="3" name="Content Placeholder 2">
+          <p:cNvPr id="4" name="Rectangle 3">
             <a:extLst>
-              <a:ext uri="{FF2B5EF4-FFF2-40B4-BE49-F238E27FC236}">
-                <a16:creationId xmlns:a16="http://schemas.microsoft.com/office/drawing/2014/main" id="{0F349726-1B51-D7EB-DB1F-E4C8AC0ADCFA}"/>
+              <a:ext uri="{C183D7F6-B498-43B3-948B-1728B52AA6E4}">
+                <adec:decorative xmlns:adec="http://schemas.microsoft.com/office/drawing/2017/decorative" val="1"/>
               </a:ext>
             </a:extLst>
           </p:cNvPr>
-          <p:cNvSpPr>
-            <a:spLocks noGrp="1"/>
-          </p:cNvSpPr>
-          <p:nvPr>
-            <p:ph sz="quarter" idx="13"/>
-          </p:nvPr>
-        </p:nvSpPr>
-        <p:spPr>
+          <p:cNvSpPr/>
+          <p:nvPr/>
+        </p:nvSpPr>
+        <p:spPr bwMode="auto">
           <a:xfrm>
-            <a:off x="285750" y="1396538"/>
-            <a:ext cx="11474450" cy="5461462"/>
+            <a:off x="574261" y="4036109"/>
+            <a:ext cx="4097131" cy="2434182"/>
           </a:xfrm>
+          <a:prstGeom prst="rect">
+            <a:avLst/>
+          </a:prstGeom>
+          <a:solidFill>
+            <a:schemeClr val="bg1">
+              <a:alpha val="90000"/>
+            </a:schemeClr>
+          </a:solidFill>
+          <a:ln w="9525" cap="flat" cmpd="sng" algn="ctr">
+            <a:noFill/>
+            <a:prstDash val="solid"/>
+            <a:round/>
+            <a:headEnd type="none" w="med" len="med"/>
+            <a:tailEnd type="none" w="med" len="med"/>
+          </a:ln>
+          <a:effectLst/>
         </p:spPr>
         <p:txBody>
-          <a:bodyPr>
-            <a:normAutofit/>
+          <a:bodyPr vert="horz" wrap="square" lIns="121920" tIns="60960" rIns="121920" bIns="60960" numCol="1" rtlCol="0" anchor="t" anchorCtr="0" compatLnSpc="1">
+            <a:prstTxWarp prst="textNoShape">
+              <a:avLst/>
+            </a:prstTxWarp>
           </a:bodyPr>
           <a:lstStyle/>
           <a:p>
-            <a:pPr marL="0" indent="0">
-              <a:buNone/>
-            </a:pPr>
-            <a:endParaRPr lang="en-GB" sz="2400" b="1" dirty="0"/>
-          </a:p>
-          <a:p>
-            <a:pPr>
+            <a:pPr defTabSz="1219170" eaLnBrk="0" fontAlgn="base" hangingPunct="0">
+              <a:spcBef>
+                <a:spcPct val="0"/>
+              </a:spcBef>
               <a:spcAft>
-                <a:spcPts val="667"/>
+                <a:spcPct val="0"/>
               </a:spcAft>
             </a:pPr>
-            <a:r>
-              <a:rPr lang="en-US" b="0" i="0" dirty="0">
-                <a:solidFill>
-                  <a:srgbClr val="222222"/>
-                </a:solidFill>
-                <a:effectLst/>
-                <a:highlight>
-                  <a:srgbClr val="FFFFFF"/>
-                </a:highlight>
-                <a:latin typeface="Arial" panose="020B0604020202020204" pitchFamily="34" charset="0"/>
-              </a:rPr>
-              <a:t>Muñoz-Rodríguez, J. A., &amp; Rodríguez-Vera, R. (2003). Evaluation of the light line displacement location for object shape detection. </a:t>
-            </a:r>
-            <a:r>
-              <a:rPr lang="en-US" b="0" i="1" dirty="0">
-                <a:solidFill>
-                  <a:srgbClr val="222222"/>
-                </a:solidFill>
-                <a:effectLst/>
-                <a:highlight>
-                  <a:srgbClr val="FFFFFF"/>
-                </a:highlight>
-                <a:latin typeface="Arial" panose="020B0604020202020204" pitchFamily="34" charset="0"/>
-              </a:rPr>
-              <a:t>Journal of Modern Optics</a:t>
-            </a:r>
-            <a:r>
-              <a:rPr lang="en-US" b="0" i="0" dirty="0">
-                <a:solidFill>
-                  <a:srgbClr val="222222"/>
-                </a:solidFill>
-                <a:effectLst/>
-                <a:highlight>
-                  <a:srgbClr val="FFFFFF"/>
-                </a:highlight>
-                <a:latin typeface="Arial" panose="020B0604020202020204" pitchFamily="34" charset="0"/>
-              </a:rPr>
-              <a:t>, </a:t>
-            </a:r>
-            <a:r>
-              <a:rPr lang="en-US" b="0" i="1" dirty="0">
-                <a:solidFill>
-                  <a:srgbClr val="222222"/>
-                </a:solidFill>
-                <a:effectLst/>
-                <a:highlight>
-                  <a:srgbClr val="FFFFFF"/>
-                </a:highlight>
-                <a:latin typeface="Arial" panose="020B0604020202020204" pitchFamily="34" charset="0"/>
-              </a:rPr>
-              <a:t>50</a:t>
-            </a:r>
-            <a:r>
-              <a:rPr lang="en-US" b="0" i="0" dirty="0">
-                <a:solidFill>
-                  <a:srgbClr val="222222"/>
-                </a:solidFill>
-                <a:effectLst/>
-                <a:highlight>
-                  <a:srgbClr val="FFFFFF"/>
-                </a:highlight>
-                <a:latin typeface="Arial" panose="020B0604020202020204" pitchFamily="34" charset="0"/>
-              </a:rPr>
-              <a:t>(1), 137-154.</a:t>
-            </a:r>
-            <a:endParaRPr lang="en-US" dirty="0"/>
-          </a:p>
-        </p:txBody>
-      </p:sp>
-      <p:sp>
-        <p:nvSpPr>
-          <p:cNvPr id="6" name="Title 1">
-            <a:extLst>
-              <a:ext uri="{FF2B5EF4-FFF2-40B4-BE49-F238E27FC236}">
-                <a16:creationId xmlns:a16="http://schemas.microsoft.com/office/drawing/2014/main" id="{95C129E1-1239-6722-6D85-75E66B0DF631}"/>
-              </a:ext>
-            </a:extLst>
-          </p:cNvPr>
+            <a:endParaRPr lang="en-US" sz="3200">
+              <a:latin typeface="Arial" charset="0"/>
+              <a:ea typeface="ＭＳ Ｐゴシック" charset="-128"/>
+              <a:cs typeface="ＭＳ Ｐゴシック" charset="-128"/>
+            </a:endParaRPr>
+          </a:p>
+        </p:txBody>
+      </p:sp>
+      <p:sp>
+        <p:nvSpPr>
+          <p:cNvPr id="5" name="Title 1"/>
           <p:cNvSpPr>
             <a:spLocks noGrp="1"/>
           </p:cNvSpPr>
@@ -4998,10 +6118,64 @@
           <a:p>
             <a:pPr algn="l"/>
             <a:r>
-              <a:rPr lang="en-US" sz="3200" dirty="0"/>
-              <a:t>References</a:t>
-            </a:r>
-            <a:endParaRPr lang="en-US" dirty="0"/>
+              <a:rPr lang="en-US" dirty="0"/>
+              <a:t>Progress</a:t>
+            </a:r>
+          </a:p>
+        </p:txBody>
+      </p:sp>
+      <p:sp>
+        <p:nvSpPr>
+          <p:cNvPr id="6" name="Content Placeholder 2"/>
+          <p:cNvSpPr>
+            <a:spLocks noGrp="1"/>
+          </p:cNvSpPr>
+          <p:nvPr>
+            <p:ph idx="4294967295"/>
+          </p:nvPr>
+        </p:nvSpPr>
+        <p:spPr>
+          <a:xfrm>
+            <a:off x="177800" y="1604800"/>
+            <a:ext cx="11785600" cy="5126200"/>
+          </a:xfrm>
+          <a:prstGeom prst="rect">
+            <a:avLst/>
+          </a:prstGeom>
+        </p:spPr>
+        <p:txBody>
+          <a:bodyPr>
+            <a:noAutofit/>
+          </a:bodyPr>
+          <a:lstStyle/>
+          <a:p>
+            <a:pPr marL="228600" lvl="1">
+              <a:spcBef>
+                <a:spcPts val="1000"/>
+              </a:spcBef>
+              <a:spcAft>
+                <a:spcPts val="667"/>
+              </a:spcAft>
+            </a:pPr>
+            <a:r>
+              <a:rPr lang="en-GB" sz="2300" dirty="0"/>
+              <a:t>By recreating the reference line dynamically, it can be observed pixel displacement with the height of the scanned object</a:t>
+            </a:r>
+            <a:br>
+              <a:rPr lang="en-GB" sz="2300" dirty="0"/>
+            </a:br>
+            <a:endParaRPr lang="en-GB" sz="2300" dirty="0"/>
+          </a:p>
+          <a:p>
+            <a:pPr marL="228600" lvl="1">
+              <a:spcBef>
+                <a:spcPts val="1000"/>
+              </a:spcBef>
+              <a:spcAft>
+                <a:spcPts val="667"/>
+              </a:spcAft>
+            </a:pPr>
+            <a:endParaRPr lang="en-GB" sz="2000" dirty="0"/>
           </a:p>
         </p:txBody>
       </p:sp>
@@ -5010,7 +6184,7 @@
           <p:cNvPr id="2" name="Slide Number Placeholder 1">
             <a:extLst>
               <a:ext uri="{FF2B5EF4-FFF2-40B4-BE49-F238E27FC236}">
-                <a16:creationId xmlns:a16="http://schemas.microsoft.com/office/drawing/2014/main" id="{EE133BF1-8CE4-50C7-E9E4-3D466980A344}"/>
+                <a16:creationId xmlns:a16="http://schemas.microsoft.com/office/drawing/2014/main" id="{00808472-73FB-818B-B904-EFDC84FDE08A}"/>
               </a:ext>
             </a:extLst>
           </p:cNvPr>
@@ -5018,7 +6192,7 @@
             <a:spLocks noGrp="1"/>
           </p:cNvSpPr>
           <p:nvPr>
-            <p:ph type="sldNum" sz="quarter" idx="15"/>
+            <p:ph type="sldNum" sz="quarter" idx="11"/>
           </p:nvPr>
         </p:nvSpPr>
         <p:spPr/>
@@ -5034,10 +6208,46 @@
           </a:p>
         </p:txBody>
       </p:sp>
+      <p:pic>
+        <p:nvPicPr>
+          <p:cNvPr id="8" name="Picture 7" descr="A graph with a line&#10;&#10;Description automatically generated">
+            <a:extLst>
+              <a:ext uri="{FF2B5EF4-FFF2-40B4-BE49-F238E27FC236}">
+                <a16:creationId xmlns:a16="http://schemas.microsoft.com/office/drawing/2014/main" id="{63A6C38C-ED9A-967C-D271-DC3C8E514EBB}"/>
+              </a:ext>
+            </a:extLst>
+          </p:cNvPr>
+          <p:cNvPicPr>
+            <a:picLocks noChangeAspect="1"/>
+          </p:cNvPicPr>
+          <p:nvPr/>
+        </p:nvPicPr>
+        <p:blipFill>
+          <a:blip r:embed="rId3">
+            <a:extLst>
+              <a:ext uri="{28A0092B-C50C-407E-A947-70E740481C1C}">
+                <a14:useLocalDpi xmlns:a14="http://schemas.microsoft.com/office/drawing/2010/main" val="0"/>
+              </a:ext>
+            </a:extLst>
+          </a:blip>
+          <a:stretch>
+            <a:fillRect/>
+          </a:stretch>
+        </p:blipFill>
+        <p:spPr>
+          <a:xfrm>
+            <a:off x="1555073" y="2289646"/>
+            <a:ext cx="8427127" cy="4180645"/>
+          </a:xfrm>
+          <a:prstGeom prst="rect">
+            <a:avLst/>
+          </a:prstGeom>
+        </p:spPr>
+      </p:pic>
     </p:spTree>
     <p:extLst>
       <p:ext uri="{BB962C8B-B14F-4D97-AF65-F5344CB8AC3E}">
-        <p14:creationId xmlns:p14="http://schemas.microsoft.com/office/powerpoint/2010/main" val="3458222353"/>
+        <p14:creationId xmlns:p14="http://schemas.microsoft.com/office/powerpoint/2010/main" val="3836912278"/>
       </p:ext>
     </p:extLst>
   </p:cSld>
@@ -5064,12 +6274,121 @@
           <a:chExt cx="0" cy="0"/>
         </a:xfrm>
       </p:grpSpPr>
+      <p:sp>
+        <p:nvSpPr>
+          <p:cNvPr id="5" name="Title 1"/>
+          <p:cNvSpPr>
+            <a:spLocks noGrp="1"/>
+          </p:cNvSpPr>
+          <p:nvPr>
+            <p:ph type="title"/>
+          </p:nvPr>
+        </p:nvSpPr>
+        <p:spPr>
+          <a:xfrm>
+            <a:off x="2752437" y="706583"/>
+            <a:ext cx="9210963" cy="888786"/>
+          </a:xfrm>
+          <a:prstGeom prst="rect">
+            <a:avLst/>
+          </a:prstGeom>
+        </p:spPr>
+        <p:txBody>
+          <a:bodyPr>
+            <a:normAutofit/>
+          </a:bodyPr>
+          <a:lstStyle/>
+          <a:p>
+            <a:pPr algn="l"/>
+            <a:r>
+              <a:rPr lang="en-US" dirty="0"/>
+              <a:t>Progress</a:t>
+            </a:r>
+          </a:p>
+        </p:txBody>
+      </p:sp>
+      <p:sp>
+        <p:nvSpPr>
+          <p:cNvPr id="6" name="Content Placeholder 2"/>
+          <p:cNvSpPr>
+            <a:spLocks noGrp="1"/>
+          </p:cNvSpPr>
+          <p:nvPr>
+            <p:ph idx="4294967295"/>
+          </p:nvPr>
+        </p:nvSpPr>
+        <p:spPr>
+          <a:xfrm>
+            <a:off x="177800" y="1604800"/>
+            <a:ext cx="11785600" cy="5126200"/>
+          </a:xfrm>
+          <a:prstGeom prst="rect">
+            <a:avLst/>
+          </a:prstGeom>
+        </p:spPr>
+        <p:txBody>
+          <a:bodyPr>
+            <a:noAutofit/>
+          </a:bodyPr>
+          <a:lstStyle/>
+          <a:p>
+            <a:pPr marL="228600" lvl="1">
+              <a:spcBef>
+                <a:spcPts val="1000"/>
+              </a:spcBef>
+              <a:spcAft>
+                <a:spcPts val="667"/>
+              </a:spcAft>
+            </a:pPr>
+            <a:r>
+              <a:rPr lang="en-GB" dirty="0"/>
+              <a:t>From pixel displacement the depth map of the frame is calculated</a:t>
+            </a:r>
+            <a:br>
+              <a:rPr lang="en-GB" sz="2300" dirty="0"/>
+            </a:br>
+            <a:br>
+              <a:rPr lang="en-GB" sz="2300" dirty="0"/>
+            </a:br>
+            <a:endParaRPr lang="en-GB" sz="2000" dirty="0"/>
+          </a:p>
+        </p:txBody>
+      </p:sp>
+      <p:sp>
+        <p:nvSpPr>
+          <p:cNvPr id="2" name="Slide Number Placeholder 1">
+            <a:extLst>
+              <a:ext uri="{FF2B5EF4-FFF2-40B4-BE49-F238E27FC236}">
+                <a16:creationId xmlns:a16="http://schemas.microsoft.com/office/drawing/2014/main" id="{00808472-73FB-818B-B904-EFDC84FDE08A}"/>
+              </a:ext>
+            </a:extLst>
+          </p:cNvPr>
+          <p:cNvSpPr>
+            <a:spLocks noGrp="1"/>
+          </p:cNvSpPr>
+          <p:nvPr>
+            <p:ph type="sldNum" sz="quarter" idx="11"/>
+          </p:nvPr>
+        </p:nvSpPr>
+        <p:spPr/>
+        <p:txBody>
+          <a:bodyPr/>
+          <a:lstStyle/>
+          <a:p>
+            <a:fld id="{0A19F3F6-C255-4AC5-91C2-3F61B6509B36}" type="slidenum">
+              <a:rPr lang="en-GB" smtClean="0"/>
+              <a:t>7</a:t>
+            </a:fld>
+            <a:endParaRPr lang="en-GB"/>
+          </a:p>
+        </p:txBody>
+      </p:sp>
       <p:pic>
         <p:nvPicPr>
-          <p:cNvPr id="11" name="Picture 10" descr="The University at sunset">
+          <p:cNvPr id="8" name="Picture 7" descr="A purple square with white text&#10;&#10;Description automatically generated">
             <a:extLst>
               <a:ext uri="{FF2B5EF4-FFF2-40B4-BE49-F238E27FC236}">
-                <a16:creationId xmlns:a16="http://schemas.microsoft.com/office/drawing/2014/main" id="{778F38A2-01CF-7145-BA22-B7FAA65198FD}"/>
+                <a16:creationId xmlns:a16="http://schemas.microsoft.com/office/drawing/2014/main" id="{1326D9F8-5278-3A53-20F2-EAC354A819C7}"/>
               </a:ext>
             </a:extLst>
           </p:cNvPr>
@@ -5082,7 +6401,7 @@
           <a:blip r:embed="rId3">
             <a:extLst>
               <a:ext uri="{28A0092B-C50C-407E-A947-70E740481C1C}">
-                <a14:useLocalDpi xmlns:a14="http://schemas.microsoft.com/office/drawing/2010/main"/>
+                <a14:useLocalDpi xmlns:a14="http://schemas.microsoft.com/office/drawing/2010/main" val="0"/>
               </a:ext>
             </a:extLst>
           </a:blip>
@@ -5092,20 +6411,144 @@
         </p:blipFill>
         <p:spPr>
           <a:xfrm>
-            <a:off x="0" y="0"/>
-            <a:ext cx="12192000" cy="6858000"/>
+            <a:off x="1723697" y="2171666"/>
+            <a:ext cx="8427127" cy="4175159"/>
           </a:xfrm>
           <a:prstGeom prst="rect">
             <a:avLst/>
           </a:prstGeom>
         </p:spPr>
       </p:pic>
-      <p:sp>
-        <p:nvSpPr>
-          <p:cNvPr id="2" name="Title 1">
+    </p:spTree>
+    <p:extLst>
+      <p:ext uri="{BB962C8B-B14F-4D97-AF65-F5344CB8AC3E}">
+        <p14:creationId xmlns:p14="http://schemas.microsoft.com/office/powerpoint/2010/main" val="655694643"/>
+      </p:ext>
+    </p:extLst>
+  </p:cSld>
+  <p:clrMapOvr>
+    <a:masterClrMapping/>
+  </p:clrMapOvr>
+</p:sld>
+</file>
+
+<file path=ppt/slides/slide8.xml><?xml version="1.0" encoding="utf-8"?>
+<p:sld xmlns:a="http://schemas.openxmlformats.org/drawingml/2006/main" xmlns:r="http://schemas.openxmlformats.org/officeDocument/2006/relationships" xmlns:p="http://schemas.openxmlformats.org/presentationml/2006/main">
+  <p:cSld>
+    <p:spTree>
+      <p:nvGrpSpPr>
+        <p:cNvPr id="1" name=""/>
+        <p:cNvGrpSpPr/>
+        <p:nvPr/>
+      </p:nvGrpSpPr>
+      <p:grpSpPr>
+        <a:xfrm>
+          <a:off x="0" y="0"/>
+          <a:ext cx="0" cy="0"/>
+          <a:chOff x="0" y="0"/>
+          <a:chExt cx="0" cy="0"/>
+        </a:xfrm>
+      </p:grpSpPr>
+      <p:sp>
+        <p:nvSpPr>
+          <p:cNvPr id="5" name="Title 1"/>
+          <p:cNvSpPr>
+            <a:spLocks noGrp="1"/>
+          </p:cNvSpPr>
+          <p:nvPr>
+            <p:ph type="title"/>
+          </p:nvPr>
+        </p:nvSpPr>
+        <p:spPr>
+          <a:xfrm>
+            <a:off x="2752437" y="706583"/>
+            <a:ext cx="9210963" cy="888786"/>
+          </a:xfrm>
+          <a:prstGeom prst="rect">
+            <a:avLst/>
+          </a:prstGeom>
+        </p:spPr>
+        <p:txBody>
+          <a:bodyPr>
+            <a:normAutofit/>
+          </a:bodyPr>
+          <a:lstStyle/>
+          <a:p>
+            <a:pPr algn="l"/>
+            <a:r>
+              <a:rPr lang="en-US" dirty="0"/>
+              <a:t>Problems…</a:t>
+            </a:r>
+          </a:p>
+        </p:txBody>
+      </p:sp>
+      <p:sp>
+        <p:nvSpPr>
+          <p:cNvPr id="6" name="Content Placeholder 2"/>
+          <p:cNvSpPr>
+            <a:spLocks noGrp="1"/>
+          </p:cNvSpPr>
+          <p:nvPr>
+            <p:ph idx="4294967295"/>
+          </p:nvPr>
+        </p:nvSpPr>
+        <p:spPr>
+          <a:xfrm>
+            <a:off x="177800" y="1604800"/>
+            <a:ext cx="11785600" cy="5126200"/>
+          </a:xfrm>
+          <a:prstGeom prst="rect">
+            <a:avLst/>
+          </a:prstGeom>
+        </p:spPr>
+        <p:txBody>
+          <a:bodyPr>
+            <a:noAutofit/>
+          </a:bodyPr>
+          <a:lstStyle/>
+          <a:p>
+            <a:pPr marL="228600" lvl="1">
+              <a:spcBef>
+                <a:spcPts val="1000"/>
+              </a:spcBef>
+              <a:spcAft>
+                <a:spcPts val="667"/>
+              </a:spcAft>
+            </a:pPr>
+            <a:r>
+              <a:rPr lang="en-GB" sz="2300" dirty="0"/>
+              <a:t>Finding pixel displacement for layer height less than 2mm</a:t>
+            </a:r>
+          </a:p>
+          <a:p>
+            <a:pPr marL="228600" lvl="1">
+              <a:spcBef>
+                <a:spcPts val="1000"/>
+              </a:spcBef>
+              <a:spcAft>
+                <a:spcPts val="667"/>
+              </a:spcAft>
+            </a:pPr>
+            <a:r>
+              <a:rPr lang="en-GB" sz="2300" dirty="0"/>
+              <a:t>Finding pixel displacement for bigger object (&gt;30mm)</a:t>
+            </a:r>
+            <a:br>
+              <a:rPr lang="en-GB" sz="2300" dirty="0"/>
+            </a:br>
+            <a:br>
+              <a:rPr lang="en-GB" sz="2300" dirty="0"/>
+            </a:br>
+            <a:endParaRPr lang="en-GB" sz="2000" dirty="0"/>
+          </a:p>
+        </p:txBody>
+      </p:sp>
+      <p:sp>
+        <p:nvSpPr>
+          <p:cNvPr id="2" name="Slide Number Placeholder 1">
             <a:extLst>
               <a:ext uri="{FF2B5EF4-FFF2-40B4-BE49-F238E27FC236}">
-                <a16:creationId xmlns:a16="http://schemas.microsoft.com/office/drawing/2014/main" id="{72C03AA1-5E47-2841-A2C0-74489FA31DDB}"/>
+                <a16:creationId xmlns:a16="http://schemas.microsoft.com/office/drawing/2014/main" id="{00808472-73FB-818B-B904-EFDC84FDE08A}"/>
               </a:ext>
             </a:extLst>
           </p:cNvPr>
@@ -5113,14 +6556,175 @@
             <a:spLocks noGrp="1"/>
           </p:cNvSpPr>
           <p:nvPr>
-            <p:ph type="title" idx="4294967295"/>
-          </p:nvPr>
-        </p:nvSpPr>
+            <p:ph type="sldNum" sz="quarter" idx="11"/>
+          </p:nvPr>
+        </p:nvSpPr>
+        <p:spPr/>
+        <p:txBody>
+          <a:bodyPr/>
+          <a:lstStyle/>
+          <a:p>
+            <a:fld id="{0A19F3F6-C255-4AC5-91C2-3F61B6509B36}" type="slidenum">
+              <a:rPr lang="en-GB" smtClean="0"/>
+              <a:t>8</a:t>
+            </a:fld>
+            <a:endParaRPr lang="en-GB"/>
+          </a:p>
+        </p:txBody>
+      </p:sp>
+      <p:pic>
+        <p:nvPicPr>
+          <p:cNvPr id="4" name="Picture 3" descr="A light beam in the dark&#10;&#10;Description automatically generated">
+            <a:extLst>
+              <a:ext uri="{FF2B5EF4-FFF2-40B4-BE49-F238E27FC236}">
+                <a16:creationId xmlns:a16="http://schemas.microsoft.com/office/drawing/2014/main" id="{16134503-E226-4FC7-1D40-B144B23EBDB7}"/>
+              </a:ext>
+            </a:extLst>
+          </p:cNvPr>
+          <p:cNvPicPr>
+            <a:picLocks noChangeAspect="1"/>
+          </p:cNvPicPr>
+          <p:nvPr/>
+        </p:nvPicPr>
+        <p:blipFill>
+          <a:blip r:embed="rId3">
+            <a:extLst>
+              <a:ext uri="{28A0092B-C50C-407E-A947-70E740481C1C}">
+                <a14:useLocalDpi xmlns:a14="http://schemas.microsoft.com/office/drawing/2010/main" val="0"/>
+              </a:ext>
+            </a:extLst>
+          </a:blip>
+          <a:stretch>
+            <a:fillRect/>
+          </a:stretch>
+        </p:blipFill>
         <p:spPr>
           <a:xfrm>
-            <a:off x="647700" y="1798637"/>
-            <a:ext cx="7737528" cy="2100263"/>
+            <a:off x="533402" y="2881312"/>
+            <a:ext cx="4876800" cy="3657600"/>
           </a:xfrm>
+          <a:prstGeom prst="rect">
+            <a:avLst/>
+          </a:prstGeom>
+        </p:spPr>
+      </p:pic>
+      <p:pic>
+        <p:nvPicPr>
+          <p:cNvPr id="9" name="Picture 8" descr="A light in the dark&#10;&#10;Description automatically generated">
+            <a:extLst>
+              <a:ext uri="{FF2B5EF4-FFF2-40B4-BE49-F238E27FC236}">
+                <a16:creationId xmlns:a16="http://schemas.microsoft.com/office/drawing/2014/main" id="{D4DBB663-A1FD-3850-9068-F78E6078EBB2}"/>
+              </a:ext>
+            </a:extLst>
+          </p:cNvPr>
+          <p:cNvPicPr>
+            <a:picLocks noChangeAspect="1"/>
+          </p:cNvPicPr>
+          <p:nvPr/>
+        </p:nvPicPr>
+        <p:blipFill>
+          <a:blip r:embed="rId4">
+            <a:extLst>
+              <a:ext uri="{28A0092B-C50C-407E-A947-70E740481C1C}">
+                <a14:useLocalDpi xmlns:a14="http://schemas.microsoft.com/office/drawing/2010/main" val="0"/>
+              </a:ext>
+            </a:extLst>
+          </a:blip>
+          <a:stretch>
+            <a:fillRect/>
+          </a:stretch>
+        </p:blipFill>
+        <p:spPr>
+          <a:xfrm>
+            <a:off x="6615165" y="2881312"/>
+            <a:ext cx="4876800" cy="3657600"/>
+          </a:xfrm>
+          <a:prstGeom prst="rect">
+            <a:avLst/>
+          </a:prstGeom>
+        </p:spPr>
+      </p:pic>
+    </p:spTree>
+    <p:extLst>
+      <p:ext uri="{BB962C8B-B14F-4D97-AF65-F5344CB8AC3E}">
+        <p14:creationId xmlns:p14="http://schemas.microsoft.com/office/powerpoint/2010/main" val="582726095"/>
+      </p:ext>
+    </p:extLst>
+  </p:cSld>
+  <p:clrMapOvr>
+    <a:masterClrMapping/>
+  </p:clrMapOvr>
+</p:sld>
+</file>
+
+<file path=ppt/slides/slide9.xml><?xml version="1.0" encoding="utf-8"?>
+<p:sld xmlns:a="http://schemas.openxmlformats.org/drawingml/2006/main" xmlns:r="http://schemas.openxmlformats.org/officeDocument/2006/relationships" xmlns:p="http://schemas.openxmlformats.org/presentationml/2006/main">
+  <p:cSld>
+    <p:spTree>
+      <p:nvGrpSpPr>
+        <p:cNvPr id="1" name=""/>
+        <p:cNvGrpSpPr/>
+        <p:nvPr/>
+      </p:nvGrpSpPr>
+      <p:grpSpPr>
+        <a:xfrm>
+          <a:off x="0" y="0"/>
+          <a:ext cx="0" cy="0"/>
+          <a:chOff x="0" y="0"/>
+          <a:chExt cx="0" cy="0"/>
+        </a:xfrm>
+      </p:grpSpPr>
+      <p:sp>
+        <p:nvSpPr>
+          <p:cNvPr id="5" name="Title 1"/>
+          <p:cNvSpPr>
+            <a:spLocks noGrp="1"/>
+          </p:cNvSpPr>
+          <p:nvPr>
+            <p:ph type="title"/>
+          </p:nvPr>
+        </p:nvSpPr>
+        <p:spPr>
+          <a:xfrm>
+            <a:off x="2752437" y="706583"/>
+            <a:ext cx="9210963" cy="888786"/>
+          </a:xfrm>
+          <a:prstGeom prst="rect">
+            <a:avLst/>
+          </a:prstGeom>
+        </p:spPr>
+        <p:txBody>
+          <a:bodyPr>
+            <a:normAutofit/>
+          </a:bodyPr>
+          <a:lstStyle/>
+          <a:p>
+            <a:pPr algn="l"/>
+            <a:r>
+              <a:rPr lang="en-US" dirty="0"/>
+              <a:t>Next Steps…</a:t>
+            </a:r>
+          </a:p>
+        </p:txBody>
+      </p:sp>
+      <p:sp>
+        <p:nvSpPr>
+          <p:cNvPr id="6" name="Content Placeholder 2"/>
+          <p:cNvSpPr>
+            <a:spLocks noGrp="1"/>
+          </p:cNvSpPr>
+          <p:nvPr>
+            <p:ph idx="4294967295"/>
+          </p:nvPr>
+        </p:nvSpPr>
+        <p:spPr>
+          <a:xfrm>
+            <a:off x="177800" y="1604800"/>
+            <a:ext cx="11785600" cy="5126200"/>
+          </a:xfrm>
+          <a:prstGeom prst="rect">
+            <a:avLst/>
+          </a:prstGeom>
         </p:spPr>
         <p:txBody>
           <a:bodyPr>
@@ -5128,371 +6732,58 @@
           </a:bodyPr>
           <a:lstStyle/>
           <a:p>
-            <a:pPr algn="l"/>
-            <a:r>
-              <a:rPr lang="en-GB" dirty="0">
-                <a:solidFill>
-                  <a:schemeClr val="bg1"/>
-                </a:solidFill>
-              </a:rPr>
-              <a:t>Thanks!</a:t>
-            </a:r>
-          </a:p>
-        </p:txBody>
-      </p:sp>
-      <p:grpSp>
-        <p:nvGrpSpPr>
-          <p:cNvPr id="20" name="Group 19">
+            <a:pPr marL="228600" lvl="1">
+              <a:spcBef>
+                <a:spcPts val="1000"/>
+              </a:spcBef>
+              <a:spcAft>
+                <a:spcPts val="667"/>
+              </a:spcAft>
+            </a:pPr>
+            <a:r>
+              <a:rPr lang="en-GB" sz="2300" dirty="0"/>
+              <a:t>From the depth map and camera intrinsics point clouds need to calculated with better accuracy (</a:t>
+            </a:r>
+            <a:r>
+              <a:rPr lang="en-GB" sz="2300"/>
+              <a:t>Need some more </a:t>
+            </a:r>
+            <a:r>
+              <a:rPr lang="en-GB" sz="2300" dirty="0"/>
+              <a:t>data)</a:t>
+            </a:r>
+          </a:p>
+          <a:p>
+            <a:pPr marL="228600" lvl="1">
+              <a:spcBef>
+                <a:spcPts val="1000"/>
+              </a:spcBef>
+              <a:spcAft>
+                <a:spcPts val="667"/>
+              </a:spcAft>
+            </a:pPr>
+            <a:r>
+              <a:rPr lang="en-GB" sz="2300" dirty="0"/>
+              <a:t>Start creating a printed layer comparison algorithm</a:t>
+            </a:r>
+            <a:endParaRPr lang="en-GB" sz="2000" dirty="0"/>
+          </a:p>
+        </p:txBody>
+      </p:sp>
+      <p:sp>
+        <p:nvSpPr>
+          <p:cNvPr id="2" name="Slide Number Placeholder 1">
             <a:extLst>
               <a:ext uri="{FF2B5EF4-FFF2-40B4-BE49-F238E27FC236}">
-                <a16:creationId xmlns:a16="http://schemas.microsoft.com/office/drawing/2014/main" id="{5E3432E9-D115-206D-6431-B4CF6626BE5C}"/>
-              </a:ext>
-              <a:ext uri="{C183D7F6-B498-43B3-948B-1728B52AA6E4}">
-                <adec:decorative xmlns:adec="http://schemas.microsoft.com/office/drawing/2017/decorative" val="1"/>
+                <a16:creationId xmlns:a16="http://schemas.microsoft.com/office/drawing/2014/main" id="{00808472-73FB-818B-B904-EFDC84FDE08A}"/>
               </a:ext>
             </a:extLst>
           </p:cNvPr>
-          <p:cNvGrpSpPr/>
-          <p:nvPr/>
-        </p:nvGrpSpPr>
-        <p:grpSpPr>
-          <a:xfrm>
-            <a:off x="8385228" y="5699322"/>
-            <a:ext cx="3413095" cy="854153"/>
-            <a:chOff x="8385228" y="5699322"/>
-            <a:chExt cx="3413095" cy="854153"/>
-          </a:xfrm>
-        </p:grpSpPr>
-        <p:sp>
-          <p:nvSpPr>
-            <p:cNvPr id="21" name="TextBox 20">
-              <a:extLst>
-                <a:ext uri="{FF2B5EF4-FFF2-40B4-BE49-F238E27FC236}">
-                  <a16:creationId xmlns:a16="http://schemas.microsoft.com/office/drawing/2014/main" id="{1040EF60-50F4-EBB4-F749-2CF288220BA6}"/>
-                </a:ext>
-              </a:extLst>
-            </p:cNvPr>
-            <p:cNvSpPr txBox="1"/>
-            <p:nvPr/>
-          </p:nvSpPr>
-          <p:spPr>
-            <a:xfrm>
-              <a:off x="8385228" y="5699322"/>
-              <a:ext cx="3413095" cy="461665"/>
-            </a:xfrm>
-            <a:prstGeom prst="rect">
-              <a:avLst/>
-            </a:prstGeom>
-            <a:noFill/>
-            <a:effectLst>
-              <a:outerShdw blurRad="1270000" dist="50800" dir="5400000" sx="200000" sy="200000" algn="ctr" rotWithShape="0">
-                <a:schemeClr val="tx1"/>
-              </a:outerShdw>
-            </a:effectLst>
-          </p:spPr>
-          <p:txBody>
-            <a:bodyPr wrap="square" rtlCol="0">
-              <a:spAutoFit/>
-            </a:bodyPr>
-            <a:lstStyle/>
-            <a:p>
-              <a:pPr algn="r"/>
-              <a:r>
-                <a:rPr lang="en-US" sz="2400" b="1" dirty="0">
-                  <a:solidFill>
-                    <a:schemeClr val="bg1"/>
-                  </a:solidFill>
-                  <a:latin typeface="Arial" panose="020B0604020202020204" pitchFamily="34" charset="0"/>
-                  <a:cs typeface="Arial" panose="020B0604020202020204" pitchFamily="34" charset="0"/>
-                </a:rPr>
-                <a:t>#</a:t>
-              </a:r>
-              <a:r>
-                <a:rPr lang="en-US" sz="2400" b="1" dirty="0" err="1">
-                  <a:solidFill>
-                    <a:schemeClr val="bg1"/>
-                  </a:solidFill>
-                  <a:latin typeface="Arial" panose="020B0604020202020204" pitchFamily="34" charset="0"/>
-                  <a:cs typeface="Arial" panose="020B0604020202020204" pitchFamily="34" charset="0"/>
-                </a:rPr>
-                <a:t>UofGWorldChangers</a:t>
-              </a:r>
-              <a:endParaRPr lang="en-US" sz="2400" b="1" dirty="0">
-                <a:solidFill>
-                  <a:schemeClr val="bg1"/>
-                </a:solidFill>
-                <a:latin typeface="Arial" panose="020B0604020202020204" pitchFamily="34" charset="0"/>
-                <a:cs typeface="Arial" panose="020B0604020202020204" pitchFamily="34" charset="0"/>
-              </a:endParaRPr>
-            </a:p>
-          </p:txBody>
-        </p:sp>
-        <p:sp>
-          <p:nvSpPr>
-            <p:cNvPr id="22" name="TextBox 21">
-              <a:extLst>
-                <a:ext uri="{FF2B5EF4-FFF2-40B4-BE49-F238E27FC236}">
-                  <a16:creationId xmlns:a16="http://schemas.microsoft.com/office/drawing/2014/main" id="{C10F721E-3F58-C3D6-3764-8B8557371C56}"/>
-                </a:ext>
-              </a:extLst>
-            </p:cNvPr>
-            <p:cNvSpPr txBox="1"/>
-            <p:nvPr/>
-          </p:nvSpPr>
-          <p:spPr>
-            <a:xfrm>
-              <a:off x="9098531" y="6091810"/>
-              <a:ext cx="2699792" cy="461665"/>
-            </a:xfrm>
-            <a:prstGeom prst="rect">
-              <a:avLst/>
-            </a:prstGeom>
-            <a:noFill/>
-          </p:spPr>
-          <p:txBody>
-            <a:bodyPr wrap="square" rtlCol="0">
-              <a:spAutoFit/>
-            </a:bodyPr>
-            <a:lstStyle/>
-            <a:p>
-              <a:pPr algn="r"/>
-              <a:r>
-                <a:rPr lang="en-US" sz="2400" b="1" dirty="0">
-                  <a:solidFill>
-                    <a:schemeClr val="bg1"/>
-                  </a:solidFill>
-                  <a:latin typeface="Arial" panose="020B0604020202020204" pitchFamily="34" charset="0"/>
-                  <a:ea typeface="Arial" charset="0"/>
-                  <a:cs typeface="Arial" panose="020B0604020202020204" pitchFamily="34" charset="0"/>
-                </a:rPr>
-                <a:t>@</a:t>
-              </a:r>
-              <a:r>
-                <a:rPr lang="en-US" sz="2400" b="1" dirty="0" err="1">
-                  <a:solidFill>
-                    <a:schemeClr val="bg1"/>
-                  </a:solidFill>
-                  <a:latin typeface="Arial" panose="020B0604020202020204" pitchFamily="34" charset="0"/>
-                  <a:ea typeface="Arial" charset="0"/>
-                  <a:cs typeface="Arial" panose="020B0604020202020204" pitchFamily="34" charset="0"/>
-                </a:rPr>
-                <a:t>UofGlasgow</a:t>
-              </a:r>
-              <a:endParaRPr lang="en-US" sz="2400" b="1" dirty="0">
-                <a:solidFill>
-                  <a:schemeClr val="bg1"/>
-                </a:solidFill>
-                <a:latin typeface="Arial" panose="020B0604020202020204" pitchFamily="34" charset="0"/>
-                <a:ea typeface="Arial" charset="0"/>
-                <a:cs typeface="Arial" panose="020B0604020202020204" pitchFamily="34" charset="0"/>
-              </a:endParaRPr>
-            </a:p>
-          </p:txBody>
-        </p:sp>
-        <p:grpSp>
-          <p:nvGrpSpPr>
-            <p:cNvPr id="23" name="Group 22">
-              <a:extLst>
-                <a:ext uri="{FF2B5EF4-FFF2-40B4-BE49-F238E27FC236}">
-                  <a16:creationId xmlns:a16="http://schemas.microsoft.com/office/drawing/2014/main" id="{71243618-BCA5-59B7-3F2F-003585B767A8}"/>
-                </a:ext>
-              </a:extLst>
-            </p:cNvPr>
-            <p:cNvGrpSpPr/>
-            <p:nvPr/>
-          </p:nvGrpSpPr>
-          <p:grpSpPr>
-            <a:xfrm>
-              <a:off x="8516481" y="6162367"/>
-              <a:ext cx="841333" cy="347112"/>
-              <a:chOff x="8601252" y="6162367"/>
-              <a:chExt cx="841333" cy="347112"/>
-            </a:xfrm>
-          </p:grpSpPr>
-          <p:pic>
-            <p:nvPicPr>
-              <p:cNvPr id="24" name="Picture 23">
-                <a:extLst>
-                  <a:ext uri="{FF2B5EF4-FFF2-40B4-BE49-F238E27FC236}">
-                    <a16:creationId xmlns:a16="http://schemas.microsoft.com/office/drawing/2014/main" id="{CEF1E1D0-4776-66CA-6593-212D8816FACD}"/>
-                  </a:ext>
-                  <a:ext uri="{C183D7F6-B498-43B3-948B-1728B52AA6E4}">
-                    <adec:decorative xmlns:adec="http://schemas.microsoft.com/office/drawing/2017/decorative" val="1"/>
-                  </a:ext>
-                </a:extLst>
-              </p:cNvPr>
-              <p:cNvPicPr>
-                <a:picLocks noChangeAspect="1"/>
-              </p:cNvPicPr>
-              <p:nvPr/>
-            </p:nvPicPr>
-            <p:blipFill>
-              <a:blip r:embed="rId4" cstate="print">
-                <a:extLst>
-                  <a:ext uri="{28A0092B-C50C-407E-A947-70E740481C1C}">
-                    <a14:useLocalDpi xmlns:a14="http://schemas.microsoft.com/office/drawing/2010/main" val="0"/>
-                  </a:ext>
-                </a:extLst>
-              </a:blip>
-              <a:stretch>
-                <a:fillRect/>
-              </a:stretch>
-            </p:blipFill>
-            <p:spPr>
-              <a:xfrm>
-                <a:off x="8778761" y="6162367"/>
-                <a:ext cx="475023" cy="347112"/>
-              </a:xfrm>
-              <a:prstGeom prst="rect">
-                <a:avLst/>
-              </a:prstGeom>
-            </p:spPr>
-          </p:pic>
-          <p:pic>
-            <p:nvPicPr>
-              <p:cNvPr id="25" name="Picture 24">
-                <a:extLst>
-                  <a:ext uri="{FF2B5EF4-FFF2-40B4-BE49-F238E27FC236}">
-                    <a16:creationId xmlns:a16="http://schemas.microsoft.com/office/drawing/2014/main" id="{DA87A7A4-A77D-8F28-1744-96EEB60F0D7C}"/>
-                  </a:ext>
-                  <a:ext uri="{C183D7F6-B498-43B3-948B-1728B52AA6E4}">
-                    <adec:decorative xmlns:adec="http://schemas.microsoft.com/office/drawing/2017/decorative" val="1"/>
-                  </a:ext>
-                </a:extLst>
-              </p:cNvPr>
-              <p:cNvPicPr>
-                <a:picLocks noChangeAspect="1"/>
-              </p:cNvPicPr>
-              <p:nvPr/>
-            </p:nvPicPr>
-            <p:blipFill>
-              <a:blip r:embed="rId5" cstate="screen">
-                <a:extLst>
-                  <a:ext uri="{28A0092B-C50C-407E-A947-70E740481C1C}">
-                    <a14:useLocalDpi xmlns:a14="http://schemas.microsoft.com/office/drawing/2010/main"/>
-                  </a:ext>
-                </a:extLst>
-              </a:blip>
-              <a:stretch>
-                <a:fillRect/>
-              </a:stretch>
-            </p:blipFill>
-            <p:spPr>
-              <a:xfrm>
-                <a:off x="9194185" y="6223334"/>
-                <a:ext cx="248400" cy="248399"/>
-              </a:xfrm>
-              <a:prstGeom prst="rect">
-                <a:avLst/>
-              </a:prstGeom>
-            </p:spPr>
-          </p:pic>
-          <p:pic>
-            <p:nvPicPr>
-              <p:cNvPr id="26" name="Picture 25">
-                <a:extLst>
-                  <a:ext uri="{FF2B5EF4-FFF2-40B4-BE49-F238E27FC236}">
-                    <a16:creationId xmlns:a16="http://schemas.microsoft.com/office/drawing/2014/main" id="{0414EE59-FA10-EF9D-539B-501F9400A104}"/>
-                  </a:ext>
-                  <a:ext uri="{C183D7F6-B498-43B3-948B-1728B52AA6E4}">
-                    <adec:decorative xmlns:adec="http://schemas.microsoft.com/office/drawing/2017/decorative" val="1"/>
-                  </a:ext>
-                </a:extLst>
-              </p:cNvPr>
-              <p:cNvPicPr>
-                <a:picLocks noChangeAspect="1"/>
-              </p:cNvPicPr>
-              <p:nvPr/>
-            </p:nvPicPr>
-            <p:blipFill>
-              <a:blip r:embed="rId6" cstate="screen">
-                <a:extLst>
-                  <a:ext uri="{28A0092B-C50C-407E-A947-70E740481C1C}">
-                    <a14:useLocalDpi xmlns:a14="http://schemas.microsoft.com/office/drawing/2010/main"/>
-                  </a:ext>
-                </a:extLst>
-              </a:blip>
-              <a:stretch>
-                <a:fillRect/>
-              </a:stretch>
-            </p:blipFill>
-            <p:spPr>
-              <a:xfrm>
-                <a:off x="8601252" y="6221141"/>
-                <a:ext cx="239105" cy="239106"/>
-              </a:xfrm>
-              <a:prstGeom prst="rect">
-                <a:avLst/>
-              </a:prstGeom>
-            </p:spPr>
-          </p:pic>
-        </p:grpSp>
-      </p:grpSp>
-      <mc:AlternateContent xmlns:mc="http://schemas.openxmlformats.org/markup-compatibility/2006" xmlns:p14="http://schemas.microsoft.com/office/powerpoint/2010/main">
-        <mc:Choice Requires="p14">
-          <p:contentPart p14:bwMode="auto" r:id="rId7">
-            <p14:nvContentPartPr>
-              <p14:cNvPr id="3" name="Ink 2">
-                <a:extLst>
-                  <a:ext uri="{FF2B5EF4-FFF2-40B4-BE49-F238E27FC236}">
-                    <a16:creationId xmlns:a16="http://schemas.microsoft.com/office/drawing/2014/main" id="{8B74F3EA-53B4-1C23-219F-09709BEB3511}"/>
-                  </a:ext>
-                </a:extLst>
-              </p14:cNvPr>
-              <p14:cNvContentPartPr/>
-              <p14:nvPr/>
-            </p14:nvContentPartPr>
-            <p14:xfrm>
-              <a:off x="2875547" y="1696187"/>
-              <a:ext cx="360" cy="360"/>
-            </p14:xfrm>
-          </p:contentPart>
-        </mc:Choice>
-        <mc:Fallback xmlns="">
-          <p:pic>
-            <p:nvPicPr>
-              <p:cNvPr id="3" name="Ink 2">
-                <a:extLst>
-                  <a:ext uri="{FF2B5EF4-FFF2-40B4-BE49-F238E27FC236}">
-                    <a16:creationId xmlns:a16="http://schemas.microsoft.com/office/drawing/2014/main" id="{8B74F3EA-53B4-1C23-219F-09709BEB3511}"/>
-                  </a:ext>
-                </a:extLst>
-              </p:cNvPr>
-              <p:cNvPicPr/>
-              <p:nvPr/>
-            </p:nvPicPr>
-            <p:blipFill>
-              <a:blip r:embed="rId8"/>
-              <a:stretch>
-                <a:fillRect/>
-              </a:stretch>
-            </p:blipFill>
-            <p:spPr>
-              <a:xfrm>
-                <a:off x="2869427" y="1690067"/>
-                <a:ext cx="12600" cy="12600"/>
-              </a:xfrm>
-              <a:prstGeom prst="rect">
-                <a:avLst/>
-              </a:prstGeom>
-            </p:spPr>
-          </p:pic>
-        </mc:Fallback>
-      </mc:AlternateContent>
-      <p:sp>
-        <p:nvSpPr>
-          <p:cNvPr id="5" name="Slide Number Placeholder 4">
-            <a:extLst>
-              <a:ext uri="{FF2B5EF4-FFF2-40B4-BE49-F238E27FC236}">
-                <a16:creationId xmlns:a16="http://schemas.microsoft.com/office/drawing/2014/main" id="{C15617A7-40BC-533A-C704-817C6437FA9D}"/>
-              </a:ext>
-            </a:extLst>
-          </p:cNvPr>
-          <p:cNvSpPr>
-            <a:spLocks noGrp="1"/>
-          </p:cNvSpPr>
-          <p:nvPr>
-            <p:ph type="sldNum" sz="quarter" idx="16"/>
+          <p:cNvSpPr>
+            <a:spLocks noGrp="1"/>
+          </p:cNvSpPr>
+          <p:nvPr>
+            <p:ph type="sldNum" sz="quarter" idx="11"/>
           </p:nvPr>
         </p:nvSpPr>
         <p:spPr/>
@@ -5502,7 +6793,7 @@
           <a:p>
             <a:fld id="{0A19F3F6-C255-4AC5-91C2-3F61B6509B36}" type="slidenum">
               <a:rPr lang="en-GB" smtClean="0"/>
-              <a:t>7</a:t>
+              <a:t>9</a:t>
             </a:fld>
             <a:endParaRPr lang="en-GB"/>
           </a:p>
@@ -5511,7 +6802,7 @@
     </p:spTree>
     <p:extLst>
       <p:ext uri="{BB962C8B-B14F-4D97-AF65-F5344CB8AC3E}">
-        <p14:creationId xmlns:p14="http://schemas.microsoft.com/office/powerpoint/2010/main" val="3006378702"/>
+        <p14:creationId xmlns:p14="http://schemas.microsoft.com/office/powerpoint/2010/main" val="1709023871"/>
       </p:ext>
     </p:extLst>
   </p:cSld>

</xml_diff>